<commit_message>
update module 3 drafts
</commit_message>
<xml_diff>
--- a/slides/On-Campus/03_01_Branching.pptx
+++ b/slides/On-Campus/03_01_Branching.pptx
@@ -5,19 +5,23 @@
     <p:sldMasterId id="2147483648" r:id="rId1"/>
   </p:sldMasterIdLst>
   <p:notesMasterIdLst>
-    <p:notesMasterId r:id="rId9"/>
+    <p:notesMasterId r:id="rId13"/>
   </p:notesMasterIdLst>
   <p:handoutMasterIdLst>
-    <p:handoutMasterId r:id="rId10"/>
+    <p:handoutMasterId r:id="rId14"/>
   </p:handoutMasterIdLst>
   <p:sldIdLst>
     <p:sldId id="256" r:id="rId2"/>
-    <p:sldId id="257" r:id="rId3"/>
-    <p:sldId id="258" r:id="rId4"/>
-    <p:sldId id="259" r:id="rId5"/>
-    <p:sldId id="260" r:id="rId6"/>
-    <p:sldId id="261" r:id="rId7"/>
-    <p:sldId id="262" r:id="rId8"/>
+    <p:sldId id="263" r:id="rId3"/>
+    <p:sldId id="264" r:id="rId4"/>
+    <p:sldId id="257" r:id="rId5"/>
+    <p:sldId id="258" r:id="rId6"/>
+    <p:sldId id="259" r:id="rId7"/>
+    <p:sldId id="260" r:id="rId8"/>
+    <p:sldId id="261" r:id="rId9"/>
+    <p:sldId id="265" r:id="rId10"/>
+    <p:sldId id="266" r:id="rId11"/>
+    <p:sldId id="262" r:id="rId12"/>
   </p:sldIdLst>
   <p:sldSz cx="13817600" cy="7772400"/>
   <p:notesSz cx="6858000" cy="9144000"/>
@@ -220,7 +224,7 @@
           <a:p>
             <a:fld id="{4D7E51A5-B478-1E40-8CBB-0DAA8831E99D}" type="datetimeFigureOut">
               <a:rPr lang="en-US" smtClean="0"/>
-              <a:t>5/6/20</a:t>
+              <a:t>8/16/21</a:t>
             </a:fld>
             <a:endParaRPr lang="en-US"/>
           </a:p>
@@ -385,7 +389,7 @@
           <a:p>
             <a:fld id="{D0ED587F-861E-6740-9643-E3DDAE89B8D6}" type="datetimeFigureOut">
               <a:rPr lang="en-US" smtClean="0"/>
-              <a:t>5/6/20</a:t>
+              <a:t>8/16/21</a:t>
             </a:fld>
             <a:endParaRPr lang="en-US"/>
           </a:p>
@@ -6709,7 +6713,2147 @@
 </p:sld>
 </file>
 
+<file path=ppt/slides/slide10.xml><?xml version="1.0" encoding="utf-8"?>
+<p:sld xmlns:a="http://schemas.openxmlformats.org/drawingml/2006/main" xmlns:r="http://schemas.openxmlformats.org/officeDocument/2006/relationships" xmlns:p="http://schemas.openxmlformats.org/presentationml/2006/main">
+  <p:cSld>
+    <p:spTree>
+      <p:nvGrpSpPr>
+        <p:cNvPr id="1" name=""/>
+        <p:cNvGrpSpPr/>
+        <p:nvPr/>
+      </p:nvGrpSpPr>
+      <p:grpSpPr>
+        <a:xfrm>
+          <a:off x="0" y="0"/>
+          <a:ext cx="0" cy="0"/>
+          <a:chOff x="0" y="0"/>
+          <a:chExt cx="0" cy="0"/>
+        </a:xfrm>
+      </p:grpSpPr>
+      <p:sp>
+        <p:nvSpPr>
+          <p:cNvPr id="2" name="Title 1">
+            <a:extLst>
+              <a:ext uri="{FF2B5EF4-FFF2-40B4-BE49-F238E27FC236}">
+                <a16:creationId xmlns:a16="http://schemas.microsoft.com/office/drawing/2014/main" id="{DCC88597-DB15-D040-A2E3-0D01AA6995C1}"/>
+              </a:ext>
+            </a:extLst>
+          </p:cNvPr>
+          <p:cNvSpPr>
+            <a:spLocks noGrp="1"/>
+          </p:cNvSpPr>
+          <p:nvPr>
+            <p:ph type="title"/>
+          </p:nvPr>
+        </p:nvSpPr>
+        <p:spPr/>
+        <p:txBody>
+          <a:bodyPr/>
+          <a:lstStyle/>
+          <a:p>
+            <a:r>
+              <a:rPr lang="en-US" dirty="0"/>
+              <a:t>Answer the following</a:t>
+            </a:r>
+          </a:p>
+        </p:txBody>
+      </p:sp>
+      <p:sp>
+        <p:nvSpPr>
+          <p:cNvPr id="3" name="Text Placeholder 2">
+            <a:extLst>
+              <a:ext uri="{FF2B5EF4-FFF2-40B4-BE49-F238E27FC236}">
+                <a16:creationId xmlns:a16="http://schemas.microsoft.com/office/drawing/2014/main" id="{E40F3497-4143-704D-80AE-52B1E62D34A8}"/>
+              </a:ext>
+            </a:extLst>
+          </p:cNvPr>
+          <p:cNvSpPr>
+            <a:spLocks noGrp="1"/>
+          </p:cNvSpPr>
+          <p:nvPr>
+            <p:ph type="body" sz="quarter" idx="10"/>
+          </p:nvPr>
+        </p:nvSpPr>
+        <p:spPr>
+          <a:xfrm>
+            <a:off x="628075" y="1776683"/>
+            <a:ext cx="4693225" cy="2438488"/>
+          </a:xfrm>
+        </p:spPr>
+        <p:txBody>
+          <a:bodyPr/>
+          <a:lstStyle/>
+          <a:p>
+            <a:pPr>
+              <a:buFont typeface="+mj-lt"/>
+              <a:buAutoNum type="arabicPeriod"/>
+            </a:pPr>
+            <a:r>
+              <a:rPr lang="en-US" dirty="0" err="1">
+                <a:latin typeface="Consolas" panose="020B0609020204030204" pitchFamily="49" charset="0"/>
+                <a:cs typeface="Consolas" panose="020B0609020204030204" pitchFamily="49" charset="0"/>
+              </a:rPr>
+              <a:t>branchingCheck</a:t>
+            </a:r>
+            <a:r>
+              <a:rPr lang="en-US" dirty="0">
+                <a:latin typeface="Consolas" panose="020B0609020204030204" pitchFamily="49" charset="0"/>
+                <a:cs typeface="Consolas" panose="020B0609020204030204" pitchFamily="49" charset="0"/>
+              </a:rPr>
+              <a:t>(10, 20, 30) </a:t>
+            </a:r>
+          </a:p>
+          <a:p>
+            <a:pPr>
+              <a:buFont typeface="+mj-lt"/>
+              <a:buAutoNum type="arabicPeriod"/>
+            </a:pPr>
+            <a:r>
+              <a:rPr lang="en-US" dirty="0" err="1">
+                <a:latin typeface="Consolas" panose="020B0609020204030204" pitchFamily="49" charset="0"/>
+                <a:cs typeface="Consolas" panose="020B0609020204030204" pitchFamily="49" charset="0"/>
+              </a:rPr>
+              <a:t>branchingCheck</a:t>
+            </a:r>
+            <a:r>
+              <a:rPr lang="en-US" dirty="0">
+                <a:latin typeface="Consolas" panose="020B0609020204030204" pitchFamily="49" charset="0"/>
+                <a:cs typeface="Consolas" panose="020B0609020204030204" pitchFamily="49" charset="0"/>
+              </a:rPr>
+              <a:t>(-1, -1, -1)</a:t>
+            </a:r>
+          </a:p>
+          <a:p>
+            <a:pPr>
+              <a:buFont typeface="+mj-lt"/>
+              <a:buAutoNum type="arabicPeriod"/>
+            </a:pPr>
+            <a:r>
+              <a:rPr lang="en-US" dirty="0" err="1">
+                <a:latin typeface="Consolas" panose="020B0609020204030204" pitchFamily="49" charset="0"/>
+                <a:cs typeface="Consolas" panose="020B0609020204030204" pitchFamily="49" charset="0"/>
+              </a:rPr>
+              <a:t>branchingCheck</a:t>
+            </a:r>
+            <a:r>
+              <a:rPr lang="en-US" dirty="0">
+                <a:latin typeface="Consolas" panose="020B0609020204030204" pitchFamily="49" charset="0"/>
+                <a:cs typeface="Consolas" panose="020B0609020204030204" pitchFamily="49" charset="0"/>
+              </a:rPr>
+              <a:t>(3, 0, 2)</a:t>
+            </a:r>
+          </a:p>
+          <a:p>
+            <a:pPr>
+              <a:buFont typeface="+mj-lt"/>
+              <a:buAutoNum type="arabicPeriod"/>
+            </a:pPr>
+            <a:r>
+              <a:rPr lang="en-US" dirty="0" err="1">
+                <a:latin typeface="Consolas" panose="020B0609020204030204" pitchFamily="49" charset="0"/>
+                <a:cs typeface="Consolas" panose="020B0609020204030204" pitchFamily="49" charset="0"/>
+              </a:rPr>
+              <a:t>branchingCheck</a:t>
+            </a:r>
+            <a:r>
+              <a:rPr lang="en-US" dirty="0">
+                <a:latin typeface="Consolas" panose="020B0609020204030204" pitchFamily="49" charset="0"/>
+                <a:cs typeface="Consolas" panose="020B0609020204030204" pitchFamily="49" charset="0"/>
+              </a:rPr>
+              <a:t>(-1, 0, 1)</a:t>
+            </a:r>
+          </a:p>
+          <a:p>
+            <a:pPr>
+              <a:buFont typeface="+mj-lt"/>
+              <a:buAutoNum type="arabicPeriod"/>
+            </a:pPr>
+            <a:r>
+              <a:rPr lang="en-US" dirty="0" err="1">
+                <a:latin typeface="Consolas" panose="020B0609020204030204" pitchFamily="49" charset="0"/>
+                <a:cs typeface="Consolas" panose="020B0609020204030204" pitchFamily="49" charset="0"/>
+              </a:rPr>
+              <a:t>branchingCheck</a:t>
+            </a:r>
+            <a:r>
+              <a:rPr lang="en-US" dirty="0">
+                <a:latin typeface="Consolas" panose="020B0609020204030204" pitchFamily="49" charset="0"/>
+                <a:cs typeface="Consolas" panose="020B0609020204030204" pitchFamily="49" charset="0"/>
+              </a:rPr>
+              <a:t>(20, 19, 18)</a:t>
+            </a:r>
+          </a:p>
+        </p:txBody>
+      </p:sp>
+      <p:sp>
+        <p:nvSpPr>
+          <p:cNvPr id="5" name="TextBox 4">
+            <a:extLst>
+              <a:ext uri="{FF2B5EF4-FFF2-40B4-BE49-F238E27FC236}">
+                <a16:creationId xmlns:a16="http://schemas.microsoft.com/office/drawing/2014/main" id="{32222D90-EB77-AB4A-8241-2A5D8AE6528E}"/>
+              </a:ext>
+            </a:extLst>
+          </p:cNvPr>
+          <p:cNvSpPr txBox="1"/>
+          <p:nvPr/>
+        </p:nvSpPr>
+        <p:spPr>
+          <a:xfrm>
+            <a:off x="4007044" y="4448145"/>
+            <a:ext cx="2901756" cy="400110"/>
+          </a:xfrm>
+          <a:prstGeom prst="rect">
+            <a:avLst/>
+          </a:prstGeom>
+          <a:noFill/>
+        </p:spPr>
+        <p:txBody>
+          <a:bodyPr wrap="none" rtlCol="0">
+            <a:spAutoFit/>
+          </a:bodyPr>
+          <a:lstStyle/>
+          <a:p>
+            <a:r>
+              <a:rPr lang="en-US" dirty="0"/>
+              <a:t>Use the tree you drew ! </a:t>
+            </a:r>
+          </a:p>
+        </p:txBody>
+      </p:sp>
+      <p:sp>
+        <p:nvSpPr>
+          <p:cNvPr id="6" name="Text Placeholder 2">
+            <a:extLst>
+              <a:ext uri="{FF2B5EF4-FFF2-40B4-BE49-F238E27FC236}">
+                <a16:creationId xmlns:a16="http://schemas.microsoft.com/office/drawing/2014/main" id="{BC944B35-F630-D64A-B227-A5DE5B4ACE37}"/>
+              </a:ext>
+            </a:extLst>
+          </p:cNvPr>
+          <p:cNvSpPr txBox="1">
+            <a:spLocks/>
+          </p:cNvSpPr>
+          <p:nvPr/>
+        </p:nvSpPr>
+        <p:spPr>
+          <a:xfrm>
+            <a:off x="6812975" y="1776683"/>
+            <a:ext cx="4693225" cy="2438488"/>
+          </a:xfrm>
+          <a:prstGeom prst="rect">
+            <a:avLst/>
+          </a:prstGeom>
+        </p:spPr>
+        <p:txBody>
+          <a:bodyPr vert="horz" lIns="91440" tIns="91440" rIns="91440" bIns="91440" rtlCol="0">
+            <a:spAutoFit/>
+          </a:bodyPr>
+          <a:lstStyle>
+            <a:lvl1pPr marL="524712" indent="-524712" algn="l" defTabSz="699614" rtl="0" eaLnBrk="1" latinLnBrk="0" hangingPunct="1">
+              <a:lnSpc>
+                <a:spcPct val="120000"/>
+              </a:lnSpc>
+              <a:spcBef>
+                <a:spcPts val="600"/>
+              </a:spcBef>
+              <a:spcAft>
+                <a:spcPts val="600"/>
+              </a:spcAft>
+              <a:buFont typeface="Arial"/>
+              <a:buChar char="•"/>
+              <a:defRPr sz="1800" b="0" i="0" kern="1200">
+                <a:solidFill>
+                  <a:srgbClr val="092529"/>
+                </a:solidFill>
+                <a:latin typeface="Proxima Nova" charset="0"/>
+                <a:ea typeface="Proxima Nova" charset="0"/>
+                <a:cs typeface="Proxima Nova" charset="0"/>
+              </a:defRPr>
+            </a:lvl1pPr>
+            <a:lvl2pPr marL="1136875" indent="-437261" algn="l" defTabSz="699614" rtl="0" eaLnBrk="1" latinLnBrk="0" hangingPunct="1">
+              <a:lnSpc>
+                <a:spcPct val="120000"/>
+              </a:lnSpc>
+              <a:spcBef>
+                <a:spcPts val="0"/>
+              </a:spcBef>
+              <a:spcAft>
+                <a:spcPts val="600"/>
+              </a:spcAft>
+              <a:buFont typeface="Arial"/>
+              <a:buChar char="–"/>
+              <a:defRPr sz="1600" b="0" i="0" kern="1200">
+                <a:solidFill>
+                  <a:srgbClr val="092529"/>
+                </a:solidFill>
+                <a:latin typeface="Proxima Nova" charset="0"/>
+                <a:ea typeface="Proxima Nova" charset="0"/>
+                <a:cs typeface="Proxima Nova" charset="0"/>
+              </a:defRPr>
+            </a:lvl2pPr>
+            <a:lvl3pPr marL="1749040" indent="-349807" algn="l" defTabSz="699614" rtl="0" eaLnBrk="1" latinLnBrk="0" hangingPunct="1">
+              <a:lnSpc>
+                <a:spcPct val="120000"/>
+              </a:lnSpc>
+              <a:spcBef>
+                <a:spcPts val="0"/>
+              </a:spcBef>
+              <a:spcAft>
+                <a:spcPts val="600"/>
+              </a:spcAft>
+              <a:buFont typeface="Arial"/>
+              <a:buChar char="•"/>
+              <a:defRPr sz="1600" b="0" i="0" kern="1200">
+                <a:solidFill>
+                  <a:srgbClr val="092529"/>
+                </a:solidFill>
+                <a:latin typeface="Proxima Nova" charset="0"/>
+                <a:ea typeface="Proxima Nova" charset="0"/>
+                <a:cs typeface="Proxima Nova" charset="0"/>
+              </a:defRPr>
+            </a:lvl3pPr>
+            <a:lvl4pPr marL="2448655" indent="-349807" algn="l" defTabSz="699614" rtl="0" eaLnBrk="1" latinLnBrk="0" hangingPunct="1">
+              <a:lnSpc>
+                <a:spcPct val="120000"/>
+              </a:lnSpc>
+              <a:spcBef>
+                <a:spcPts val="0"/>
+              </a:spcBef>
+              <a:spcAft>
+                <a:spcPts val="600"/>
+              </a:spcAft>
+              <a:buFont typeface="Arial"/>
+              <a:buChar char="–"/>
+              <a:defRPr sz="1600" b="0" i="0" kern="1200">
+                <a:solidFill>
+                  <a:srgbClr val="092529"/>
+                </a:solidFill>
+                <a:latin typeface="Proxima Nova" charset="0"/>
+                <a:ea typeface="Proxima Nova" charset="0"/>
+                <a:cs typeface="Proxima Nova" charset="0"/>
+              </a:defRPr>
+            </a:lvl4pPr>
+            <a:lvl5pPr marL="3148272" indent="-349807" algn="l" defTabSz="699614" rtl="0" eaLnBrk="1" latinLnBrk="0" hangingPunct="1">
+              <a:spcBef>
+                <a:spcPct val="20000"/>
+              </a:spcBef>
+              <a:buFont typeface="Arial"/>
+              <a:buChar char="»"/>
+              <a:defRPr sz="1648" b="0" kern="1200">
+                <a:solidFill>
+                  <a:srgbClr val="092529"/>
+                </a:solidFill>
+                <a:latin typeface="Franklin Gothic Book" charset="0"/>
+                <a:ea typeface="Franklin Gothic Book" charset="0"/>
+                <a:cs typeface="Franklin Gothic Book" charset="0"/>
+              </a:defRPr>
+            </a:lvl5pPr>
+            <a:lvl6pPr marL="3847888" indent="-349807" algn="l" defTabSz="699614" rtl="0" eaLnBrk="1" latinLnBrk="0" hangingPunct="1">
+              <a:spcBef>
+                <a:spcPct val="20000"/>
+              </a:spcBef>
+              <a:buFont typeface="Arial"/>
+              <a:buChar char="•"/>
+              <a:defRPr sz="3022" kern="1200">
+                <a:solidFill>
+                  <a:schemeClr val="tx1"/>
+                </a:solidFill>
+                <a:latin typeface="+mn-lt"/>
+                <a:ea typeface="+mn-ea"/>
+                <a:cs typeface="+mn-cs"/>
+              </a:defRPr>
+            </a:lvl6pPr>
+            <a:lvl7pPr marL="4547505" indent="-349807" algn="l" defTabSz="699614" rtl="0" eaLnBrk="1" latinLnBrk="0" hangingPunct="1">
+              <a:spcBef>
+                <a:spcPct val="20000"/>
+              </a:spcBef>
+              <a:buFont typeface="Arial"/>
+              <a:buChar char="•"/>
+              <a:defRPr sz="3022" kern="1200">
+                <a:solidFill>
+                  <a:schemeClr val="tx1"/>
+                </a:solidFill>
+                <a:latin typeface="+mn-lt"/>
+                <a:ea typeface="+mn-ea"/>
+                <a:cs typeface="+mn-cs"/>
+              </a:defRPr>
+            </a:lvl7pPr>
+            <a:lvl8pPr marL="5247119" indent="-349807" algn="l" defTabSz="699614" rtl="0" eaLnBrk="1" latinLnBrk="0" hangingPunct="1">
+              <a:spcBef>
+                <a:spcPct val="20000"/>
+              </a:spcBef>
+              <a:buFont typeface="Arial"/>
+              <a:buChar char="•"/>
+              <a:defRPr sz="3022" kern="1200">
+                <a:solidFill>
+                  <a:schemeClr val="tx1"/>
+                </a:solidFill>
+                <a:latin typeface="+mn-lt"/>
+                <a:ea typeface="+mn-ea"/>
+                <a:cs typeface="+mn-cs"/>
+              </a:defRPr>
+            </a:lvl8pPr>
+            <a:lvl9pPr marL="5946736" indent="-349807" algn="l" defTabSz="699614" rtl="0" eaLnBrk="1" latinLnBrk="0" hangingPunct="1">
+              <a:spcBef>
+                <a:spcPct val="20000"/>
+              </a:spcBef>
+              <a:buFont typeface="Arial"/>
+              <a:buChar char="•"/>
+              <a:defRPr sz="3022" kern="1200">
+                <a:solidFill>
+                  <a:schemeClr val="tx1"/>
+                </a:solidFill>
+                <a:latin typeface="+mn-lt"/>
+                <a:ea typeface="+mn-ea"/>
+                <a:cs typeface="+mn-cs"/>
+              </a:defRPr>
+            </a:lvl9pPr>
+          </a:lstStyle>
+          <a:p>
+            <a:pPr>
+              <a:buFont typeface="+mj-lt"/>
+              <a:buAutoNum type="arabicPeriod"/>
+            </a:pPr>
+            <a:r>
+              <a:rPr lang="en-US" dirty="0">
+                <a:latin typeface="+mn-lt"/>
+                <a:cs typeface="Consolas" panose="020B0609020204030204" pitchFamily="49" charset="0"/>
+              </a:rPr>
+              <a:t>The value of pi is: 3.14</a:t>
+            </a:r>
+          </a:p>
+          <a:p>
+            <a:pPr>
+              <a:buFont typeface="+mj-lt"/>
+              <a:buAutoNum type="arabicPeriod"/>
+            </a:pPr>
+            <a:r>
+              <a:rPr lang="en-US" dirty="0">
+                <a:latin typeface="+mn-lt"/>
+                <a:cs typeface="Consolas" panose="020B0609020204030204" pitchFamily="49" charset="0"/>
+              </a:rPr>
+              <a:t>I need more</a:t>
+            </a:r>
+          </a:p>
+          <a:p>
+            <a:pPr>
+              <a:buFont typeface="+mj-lt"/>
+              <a:buAutoNum type="arabicPeriod"/>
+            </a:pPr>
+            <a:r>
+              <a:rPr lang="en-US" dirty="0">
+                <a:latin typeface="+mn-lt"/>
+                <a:cs typeface="Consolas" panose="020B0609020204030204" pitchFamily="49" charset="0"/>
+              </a:rPr>
+              <a:t>no pie</a:t>
+            </a:r>
+          </a:p>
+          <a:p>
+            <a:pPr>
+              <a:buFont typeface="+mj-lt"/>
+              <a:buAutoNum type="arabicPeriod"/>
+            </a:pPr>
+            <a:r>
+              <a:rPr lang="el-GR" dirty="0">
+                <a:latin typeface="+mn-lt"/>
+                <a:cs typeface="Consolas" panose="020B0609020204030204" pitchFamily="49" charset="0"/>
+              </a:rPr>
+              <a:t>π</a:t>
+            </a:r>
+            <a:endParaRPr lang="en-US" dirty="0">
+              <a:latin typeface="+mn-lt"/>
+              <a:cs typeface="Consolas" panose="020B0609020204030204" pitchFamily="49" charset="0"/>
+            </a:endParaRPr>
+          </a:p>
+          <a:p>
+            <a:pPr>
+              <a:buFont typeface="+mj-lt"/>
+              <a:buAutoNum type="arabicPeriod"/>
+            </a:pPr>
+            <a:r>
+              <a:rPr lang="en-US" dirty="0">
+                <a:latin typeface="+mn-lt"/>
+                <a:cs typeface="Consolas" panose="020B0609020204030204" pitchFamily="49" charset="0"/>
+              </a:rPr>
+              <a:t>I like pie</a:t>
+            </a:r>
+          </a:p>
+        </p:txBody>
+      </p:sp>
+    </p:spTree>
+    <p:extLst>
+      <p:ext uri="{BB962C8B-B14F-4D97-AF65-F5344CB8AC3E}">
+        <p14:creationId xmlns:p14="http://schemas.microsoft.com/office/powerpoint/2010/main" val="1459189595"/>
+      </p:ext>
+    </p:extLst>
+  </p:cSld>
+  <p:clrMapOvr>
+    <a:masterClrMapping/>
+  </p:clrMapOvr>
+  <mc:AlternateContent xmlns:mc="http://schemas.openxmlformats.org/markup-compatibility/2006" xmlns:p14="http://schemas.microsoft.com/office/powerpoint/2010/main">
+    <mc:Choice Requires="p14">
+      <p:transition p14:dur="300">
+        <p:fade/>
+      </p:transition>
+    </mc:Choice>
+    <mc:Fallback xmlns="">
+      <p:transition>
+        <p:fade/>
+      </p:transition>
+    </mc:Fallback>
+  </mc:AlternateContent>
+  <p:timing>
+    <p:tnLst>
+      <p:par>
+        <p:cTn id="1" dur="indefinite" restart="never" nodeType="tmRoot">
+          <p:childTnLst>
+            <p:seq concurrent="1" nextAc="seek">
+              <p:cTn id="2" dur="indefinite" nodeType="mainSeq">
+                <p:childTnLst>
+                  <p:par>
+                    <p:cTn id="3" fill="hold">
+                      <p:stCondLst>
+                        <p:cond delay="indefinite"/>
+                      </p:stCondLst>
+                      <p:childTnLst>
+                        <p:par>
+                          <p:cTn id="4" fill="hold">
+                            <p:stCondLst>
+                              <p:cond delay="0"/>
+                            </p:stCondLst>
+                            <p:childTnLst>
+                              <p:par>
+                                <p:cTn id="5" presetID="45" presetClass="entr" presetSubtype="0" fill="hold" grpId="0" nodeType="clickEffect">
+                                  <p:stCondLst>
+                                    <p:cond delay="0"/>
+                                  </p:stCondLst>
+                                  <p:childTnLst>
+                                    <p:set>
+                                      <p:cBhvr>
+                                        <p:cTn id="6" dur="1" fill="hold">
+                                          <p:stCondLst>
+                                            <p:cond delay="0"/>
+                                          </p:stCondLst>
+                                        </p:cTn>
+                                        <p:tgtEl>
+                                          <p:spTgt spid="6"/>
+                                        </p:tgtEl>
+                                        <p:attrNameLst>
+                                          <p:attrName>style.visibility</p:attrName>
+                                        </p:attrNameLst>
+                                      </p:cBhvr>
+                                      <p:to>
+                                        <p:strVal val="visible"/>
+                                      </p:to>
+                                    </p:set>
+                                    <p:animEffect transition="in" filter="fade">
+                                      <p:cBhvr>
+                                        <p:cTn id="7" dur="2000"/>
+                                        <p:tgtEl>
+                                          <p:spTgt spid="6"/>
+                                        </p:tgtEl>
+                                      </p:cBhvr>
+                                    </p:animEffect>
+                                    <p:anim calcmode="lin" valueType="num">
+                                      <p:cBhvr>
+                                        <p:cTn id="8" dur="2000" fill="hold"/>
+                                        <p:tgtEl>
+                                          <p:spTgt spid="6"/>
+                                        </p:tgtEl>
+                                        <p:attrNameLst>
+                                          <p:attrName>ppt_w</p:attrName>
+                                        </p:attrNameLst>
+                                      </p:cBhvr>
+                                      <p:tavLst>
+                                        <p:tav tm="0" fmla="#ppt_w*sin(2.5*pi*$)">
+                                          <p:val>
+                                            <p:fltVal val="0"/>
+                                          </p:val>
+                                        </p:tav>
+                                        <p:tav tm="100000">
+                                          <p:val>
+                                            <p:fltVal val="1"/>
+                                          </p:val>
+                                        </p:tav>
+                                      </p:tavLst>
+                                    </p:anim>
+                                    <p:anim calcmode="lin" valueType="num">
+                                      <p:cBhvr>
+                                        <p:cTn id="9" dur="2000" fill="hold"/>
+                                        <p:tgtEl>
+                                          <p:spTgt spid="6"/>
+                                        </p:tgtEl>
+                                        <p:attrNameLst>
+                                          <p:attrName>ppt_h</p:attrName>
+                                        </p:attrNameLst>
+                                      </p:cBhvr>
+                                      <p:tavLst>
+                                        <p:tav tm="0">
+                                          <p:val>
+                                            <p:strVal val="#ppt_h"/>
+                                          </p:val>
+                                        </p:tav>
+                                        <p:tav tm="100000">
+                                          <p:val>
+                                            <p:strVal val="#ppt_h"/>
+                                          </p:val>
+                                        </p:tav>
+                                      </p:tavLst>
+                                    </p:anim>
+                                  </p:childTnLst>
+                                </p:cTn>
+                              </p:par>
+                            </p:childTnLst>
+                          </p:cTn>
+                        </p:par>
+                      </p:childTnLst>
+                    </p:cTn>
+                  </p:par>
+                </p:childTnLst>
+              </p:cTn>
+              <p:prevCondLst>
+                <p:cond evt="onPrev" delay="0">
+                  <p:tgtEl>
+                    <p:sldTgt/>
+                  </p:tgtEl>
+                </p:cond>
+              </p:prevCondLst>
+              <p:nextCondLst>
+                <p:cond evt="onNext" delay="0">
+                  <p:tgtEl>
+                    <p:sldTgt/>
+                  </p:tgtEl>
+                </p:cond>
+              </p:nextCondLst>
+            </p:seq>
+          </p:childTnLst>
+        </p:cTn>
+      </p:par>
+    </p:tnLst>
+    <p:bldLst>
+      <p:bldP spid="6" grpId="0"/>
+    </p:bldLst>
+  </p:timing>
+</p:sld>
+</file>
+
+<file path=ppt/slides/slide11.xml><?xml version="1.0" encoding="utf-8"?>
+<p:sld xmlns:a="http://schemas.openxmlformats.org/drawingml/2006/main" xmlns:r="http://schemas.openxmlformats.org/officeDocument/2006/relationships" xmlns:p="http://schemas.openxmlformats.org/presentationml/2006/main">
+  <p:cSld>
+    <p:spTree>
+      <p:nvGrpSpPr>
+        <p:cNvPr id="1" name=""/>
+        <p:cNvGrpSpPr/>
+        <p:nvPr/>
+      </p:nvGrpSpPr>
+      <p:grpSpPr>
+        <a:xfrm>
+          <a:off x="0" y="0"/>
+          <a:ext cx="0" cy="0"/>
+          <a:chOff x="0" y="0"/>
+          <a:chExt cx="0" cy="0"/>
+        </a:xfrm>
+      </p:grpSpPr>
+      <p:sp>
+        <p:nvSpPr>
+          <p:cNvPr id="2" name="Title 1">
+            <a:extLst>
+              <a:ext uri="{FF2B5EF4-FFF2-40B4-BE49-F238E27FC236}">
+                <a16:creationId xmlns:a16="http://schemas.microsoft.com/office/drawing/2014/main" id="{8A960FE9-0770-C34E-A6A1-30B718ADCE1A}"/>
+              </a:ext>
+            </a:extLst>
+          </p:cNvPr>
+          <p:cNvSpPr>
+            <a:spLocks noGrp="1"/>
+          </p:cNvSpPr>
+          <p:nvPr>
+            <p:ph type="title"/>
+          </p:nvPr>
+        </p:nvSpPr>
+        <p:spPr/>
+        <p:txBody>
+          <a:bodyPr/>
+          <a:lstStyle/>
+          <a:p>
+            <a:r>
+              <a:rPr lang="en-US" dirty="0"/>
+              <a:t>Review</a:t>
+            </a:r>
+          </a:p>
+        </p:txBody>
+      </p:sp>
+      <p:sp>
+        <p:nvSpPr>
+          <p:cNvPr id="3" name="Text Placeholder 2">
+            <a:extLst>
+              <a:ext uri="{FF2B5EF4-FFF2-40B4-BE49-F238E27FC236}">
+                <a16:creationId xmlns:a16="http://schemas.microsoft.com/office/drawing/2014/main" id="{58623002-8530-7041-8EE6-F33173423322}"/>
+              </a:ext>
+            </a:extLst>
+          </p:cNvPr>
+          <p:cNvSpPr>
+            <a:spLocks noGrp="1"/>
+          </p:cNvSpPr>
+          <p:nvPr>
+            <p:ph type="body" sz="quarter" idx="10"/>
+          </p:nvPr>
+        </p:nvSpPr>
+        <p:spPr>
+          <a:xfrm>
+            <a:off x="628075" y="1776683"/>
+            <a:ext cx="12561453" cy="5405839"/>
+          </a:xfrm>
+        </p:spPr>
+        <p:txBody>
+          <a:bodyPr/>
+          <a:lstStyle/>
+          <a:p>
+            <a:r>
+              <a:rPr lang="en-US" dirty="0"/>
+              <a:t>Conditional operators compare </a:t>
+            </a:r>
+            <a:r>
+              <a:rPr lang="en-US" b="1" dirty="0"/>
+              <a:t>primitives</a:t>
+            </a:r>
+            <a:r>
+              <a:rPr lang="en-US" dirty="0"/>
+              <a:t> to evaluate to </a:t>
+            </a:r>
+            <a:r>
+              <a:rPr lang="en-US" b="1" dirty="0"/>
+              <a:t>true </a:t>
+            </a:r>
+            <a:r>
+              <a:rPr lang="en-US" dirty="0"/>
+              <a:t>or </a:t>
+            </a:r>
+            <a:r>
+              <a:rPr lang="en-US" b="1" dirty="0"/>
+              <a:t>false</a:t>
+            </a:r>
+          </a:p>
+          <a:p>
+            <a:pPr lvl="1" fontAlgn="base"/>
+            <a:r>
+              <a:rPr lang="en-US" dirty="0"/>
+              <a:t>==   Equals</a:t>
+            </a:r>
+          </a:p>
+          <a:p>
+            <a:pPr lvl="1" fontAlgn="base"/>
+            <a:r>
+              <a:rPr lang="en-US" dirty="0"/>
+              <a:t>&lt;     Less than (is left less than right)</a:t>
+            </a:r>
+          </a:p>
+          <a:p>
+            <a:pPr lvl="1" fontAlgn="base"/>
+            <a:r>
+              <a:rPr lang="en-US" dirty="0"/>
+              <a:t>&gt;     Greater than</a:t>
+            </a:r>
+          </a:p>
+          <a:p>
+            <a:pPr lvl="1" fontAlgn="base"/>
+            <a:r>
+              <a:rPr lang="en-US" dirty="0"/>
+              <a:t>&lt;=   Less than OR equal</a:t>
+            </a:r>
+          </a:p>
+          <a:p>
+            <a:pPr lvl="1" fontAlgn="base"/>
+            <a:r>
+              <a:rPr lang="en-US" dirty="0"/>
+              <a:t>&gt;=   Greater than OR equal</a:t>
+            </a:r>
+          </a:p>
+          <a:p>
+            <a:pPr lvl="1" fontAlgn="base"/>
+            <a:r>
+              <a:rPr lang="en-US" dirty="0"/>
+              <a:t>!=    NOT equal ( ! is your NOT character)</a:t>
+            </a:r>
+          </a:p>
+          <a:p>
+            <a:pPr fontAlgn="base"/>
+            <a:r>
+              <a:rPr lang="en-US" dirty="0"/>
+              <a:t>if statements execute a block of code, if </a:t>
+            </a:r>
+            <a:r>
+              <a:rPr lang="en-US" b="1" dirty="0"/>
+              <a:t>true</a:t>
+            </a:r>
+            <a:r>
+              <a:rPr lang="en-US" dirty="0"/>
+              <a:t> in the condition </a:t>
+            </a:r>
+          </a:p>
+          <a:p>
+            <a:pPr fontAlgn="base"/>
+            <a:r>
+              <a:rPr lang="en-US" dirty="0"/>
+              <a:t>else statements execute a block of code, if </a:t>
+            </a:r>
+            <a:r>
+              <a:rPr lang="en-US" b="1" dirty="0"/>
+              <a:t>false</a:t>
+            </a:r>
+            <a:r>
+              <a:rPr lang="en-US" dirty="0"/>
+              <a:t> in an if condition (else is optional)</a:t>
+            </a:r>
+          </a:p>
+          <a:p>
+            <a:pPr fontAlgn="base"/>
+            <a:r>
+              <a:rPr lang="en-US" dirty="0"/>
+              <a:t>Practice </a:t>
+            </a:r>
+            <a:r>
+              <a:rPr lang="en-US" b="1" dirty="0"/>
+              <a:t>drawing</a:t>
+            </a:r>
+            <a:r>
+              <a:rPr lang="en-US" dirty="0"/>
+              <a:t> the tree!!</a:t>
+            </a:r>
+          </a:p>
+          <a:p>
+            <a:pPr lvl="1" fontAlgn="base"/>
+            <a:r>
+              <a:rPr lang="en-US" dirty="0"/>
+              <a:t>Really, makes them a lot easier, especially when nested</a:t>
+            </a:r>
+          </a:p>
+          <a:p>
+            <a:pPr lvl="1" fontAlgn="base"/>
+            <a:r>
+              <a:rPr lang="en-US" dirty="0"/>
+              <a:t>“never the two shall pass”</a:t>
+            </a:r>
+          </a:p>
+          <a:p>
+            <a:endParaRPr lang="en-US" dirty="0"/>
+          </a:p>
+        </p:txBody>
+      </p:sp>
+    </p:spTree>
+    <p:extLst>
+      <p:ext uri="{BB962C8B-B14F-4D97-AF65-F5344CB8AC3E}">
+        <p14:creationId xmlns:p14="http://schemas.microsoft.com/office/powerpoint/2010/main" val="3877744934"/>
+      </p:ext>
+    </p:extLst>
+  </p:cSld>
+  <p:clrMapOvr>
+    <a:masterClrMapping/>
+  </p:clrMapOvr>
+  <mc:AlternateContent xmlns:mc="http://schemas.openxmlformats.org/markup-compatibility/2006" xmlns:p14="http://schemas.microsoft.com/office/powerpoint/2010/main">
+    <mc:Choice Requires="p14">
+      <p:transition p14:dur="300">
+        <p:fade/>
+      </p:transition>
+    </mc:Choice>
+    <mc:Fallback xmlns="">
+      <p:transition>
+        <p:fade/>
+      </p:transition>
+    </mc:Fallback>
+  </mc:AlternateContent>
+</p:sld>
+</file>
+
 <file path=ppt/slides/slide2.xml><?xml version="1.0" encoding="utf-8"?>
+<p:sld xmlns:a="http://schemas.openxmlformats.org/drawingml/2006/main" xmlns:r="http://schemas.openxmlformats.org/officeDocument/2006/relationships" xmlns:p="http://schemas.openxmlformats.org/presentationml/2006/main">
+  <p:cSld>
+    <p:spTree>
+      <p:nvGrpSpPr>
+        <p:cNvPr id="1" name=""/>
+        <p:cNvGrpSpPr/>
+        <p:nvPr/>
+      </p:nvGrpSpPr>
+      <p:grpSpPr>
+        <a:xfrm>
+          <a:off x="0" y="0"/>
+          <a:ext cx="0" cy="0"/>
+          <a:chOff x="0" y="0"/>
+          <a:chExt cx="0" cy="0"/>
+        </a:xfrm>
+      </p:grpSpPr>
+      <p:sp>
+        <p:nvSpPr>
+          <p:cNvPr id="4" name="Title 3">
+            <a:extLst>
+              <a:ext uri="{FF2B5EF4-FFF2-40B4-BE49-F238E27FC236}">
+                <a16:creationId xmlns:a16="http://schemas.microsoft.com/office/drawing/2014/main" id="{620A3359-A41D-9C40-935A-8F4252BF43C8}"/>
+              </a:ext>
+            </a:extLst>
+          </p:cNvPr>
+          <p:cNvSpPr>
+            <a:spLocks noGrp="1"/>
+          </p:cNvSpPr>
+          <p:nvPr>
+            <p:ph type="title"/>
+          </p:nvPr>
+        </p:nvSpPr>
+        <p:spPr/>
+        <p:txBody>
+          <a:bodyPr/>
+          <a:lstStyle/>
+          <a:p>
+            <a:r>
+              <a:rPr lang="en-US" dirty="0"/>
+              <a:t>Announcements  </a:t>
+            </a:r>
+          </a:p>
+        </p:txBody>
+      </p:sp>
+      <p:sp>
+        <p:nvSpPr>
+          <p:cNvPr id="5" name="Text Placeholder 4">
+            <a:extLst>
+              <a:ext uri="{FF2B5EF4-FFF2-40B4-BE49-F238E27FC236}">
+                <a16:creationId xmlns:a16="http://schemas.microsoft.com/office/drawing/2014/main" id="{1B7401AB-3619-7845-BD24-DBB2ED3FAD99}"/>
+              </a:ext>
+            </a:extLst>
+          </p:cNvPr>
+          <p:cNvSpPr>
+            <a:spLocks noGrp="1"/>
+          </p:cNvSpPr>
+          <p:nvPr>
+            <p:ph type="body" sz="quarter" idx="10"/>
+          </p:nvPr>
+        </p:nvSpPr>
+        <p:spPr>
+          <a:xfrm>
+            <a:off x="628075" y="1776683"/>
+            <a:ext cx="12561453" cy="3590470"/>
+          </a:xfrm>
+        </p:spPr>
+        <p:txBody>
+          <a:bodyPr/>
+          <a:lstStyle/>
+          <a:p>
+            <a:r>
+              <a:rPr lang="en-US" dirty="0"/>
+              <a:t>Practical 1  -  work on it right away!</a:t>
+            </a:r>
+          </a:p>
+          <a:p>
+            <a:pPr lvl="1"/>
+            <a:r>
+              <a:rPr lang="en-US" dirty="0"/>
+              <a:t>Only three files have errors (rest are read only)</a:t>
+            </a:r>
+          </a:p>
+          <a:p>
+            <a:pPr lvl="1"/>
+            <a:r>
+              <a:rPr lang="en-US" dirty="0"/>
+              <a:t>Debugging is hard! </a:t>
+            </a:r>
+          </a:p>
+          <a:p>
+            <a:pPr lvl="2"/>
+            <a:r>
+              <a:rPr lang="en-US" dirty="0"/>
+              <a:t>Especially if you wait until all the code is written…</a:t>
+            </a:r>
+          </a:p>
+          <a:p>
+            <a:r>
+              <a:rPr lang="en-US" dirty="0"/>
+              <a:t>Next week:</a:t>
+            </a:r>
+          </a:p>
+          <a:p>
+            <a:pPr lvl="1"/>
+            <a:r>
+              <a:rPr lang="en-US" dirty="0"/>
+              <a:t>Monday – help on debugging / coding follow along</a:t>
+            </a:r>
+          </a:p>
+          <a:p>
+            <a:pPr lvl="1"/>
+            <a:r>
+              <a:rPr lang="en-US" dirty="0"/>
+              <a:t>Coding exam – Tuesday in Lab</a:t>
+            </a:r>
+          </a:p>
+          <a:p>
+            <a:pPr lvl="1"/>
+            <a:r>
+              <a:rPr lang="en-US" dirty="0"/>
+              <a:t>Wednesday  - review session – based purely on your questions</a:t>
+            </a:r>
+          </a:p>
+          <a:p>
+            <a:pPr lvl="1"/>
+            <a:r>
+              <a:rPr lang="en-US" dirty="0"/>
+              <a:t>Canvas exam – Thursday in Lab</a:t>
+            </a:r>
+          </a:p>
+        </p:txBody>
+      </p:sp>
+    </p:spTree>
+    <p:extLst>
+      <p:ext uri="{BB962C8B-B14F-4D97-AF65-F5344CB8AC3E}">
+        <p14:creationId xmlns:p14="http://schemas.microsoft.com/office/powerpoint/2010/main" val="2526592150"/>
+      </p:ext>
+    </p:extLst>
+  </p:cSld>
+  <p:clrMapOvr>
+    <a:masterClrMapping/>
+  </p:clrMapOvr>
+  <mc:AlternateContent xmlns:mc="http://schemas.openxmlformats.org/markup-compatibility/2006" xmlns:p14="http://schemas.microsoft.com/office/powerpoint/2010/main">
+    <mc:Choice Requires="p14">
+      <p:transition p14:dur="300">
+        <p:fade/>
+      </p:transition>
+    </mc:Choice>
+    <mc:Fallback xmlns="">
+      <p:transition>
+        <p:fade/>
+      </p:transition>
+    </mc:Fallback>
+  </mc:AlternateContent>
+</p:sld>
+</file>
+
+<file path=ppt/slides/slide3.xml><?xml version="1.0" encoding="utf-8"?>
+<p:sld xmlns:a="http://schemas.openxmlformats.org/drawingml/2006/main" xmlns:r="http://schemas.openxmlformats.org/officeDocument/2006/relationships" xmlns:p="http://schemas.openxmlformats.org/presentationml/2006/main">
+  <p:cSld>
+    <p:spTree>
+      <p:nvGrpSpPr>
+        <p:cNvPr id="1" name=""/>
+        <p:cNvGrpSpPr/>
+        <p:nvPr/>
+      </p:nvGrpSpPr>
+      <p:grpSpPr>
+        <a:xfrm>
+          <a:off x="0" y="0"/>
+          <a:ext cx="0" cy="0"/>
+          <a:chOff x="0" y="0"/>
+          <a:chExt cx="0" cy="0"/>
+        </a:xfrm>
+      </p:grpSpPr>
+      <p:sp>
+        <p:nvSpPr>
+          <p:cNvPr id="2" name="Title 1">
+            <a:extLst>
+              <a:ext uri="{FF2B5EF4-FFF2-40B4-BE49-F238E27FC236}">
+                <a16:creationId xmlns:a16="http://schemas.microsoft.com/office/drawing/2014/main" id="{83DD6C50-9D9F-9842-A32B-19B9DF43486E}"/>
+              </a:ext>
+            </a:extLst>
+          </p:cNvPr>
+          <p:cNvSpPr>
+            <a:spLocks noGrp="1"/>
+          </p:cNvSpPr>
+          <p:nvPr>
+            <p:ph type="title"/>
+          </p:nvPr>
+        </p:nvSpPr>
+        <p:spPr/>
+        <p:txBody>
+          <a:bodyPr/>
+          <a:lstStyle/>
+          <a:p>
+            <a:r>
+              <a:rPr lang="en-US" dirty="0"/>
+              <a:t>Reading Check-in</a:t>
+            </a:r>
+          </a:p>
+        </p:txBody>
+      </p:sp>
+      <p:sp>
+        <p:nvSpPr>
+          <p:cNvPr id="3" name="Text Placeholder 2">
+            <a:extLst>
+              <a:ext uri="{FF2B5EF4-FFF2-40B4-BE49-F238E27FC236}">
+                <a16:creationId xmlns:a16="http://schemas.microsoft.com/office/drawing/2014/main" id="{CD1C9BB5-2FD4-BD4D-BD0C-C8B2391EC783}"/>
+              </a:ext>
+            </a:extLst>
+          </p:cNvPr>
+          <p:cNvSpPr>
+            <a:spLocks noGrp="1"/>
+          </p:cNvSpPr>
+          <p:nvPr>
+            <p:ph type="body" sz="quarter" idx="10"/>
+          </p:nvPr>
+        </p:nvSpPr>
+        <p:spPr>
+          <a:xfrm>
+            <a:off x="6908800" y="4735782"/>
+            <a:ext cx="3753428" cy="529376"/>
+          </a:xfrm>
+        </p:spPr>
+        <p:txBody>
+          <a:bodyPr/>
+          <a:lstStyle/>
+          <a:p>
+            <a:r>
+              <a:rPr lang="en-US" sz="2000" dirty="0"/>
+              <a:t>What is printed?</a:t>
+            </a:r>
+          </a:p>
+        </p:txBody>
+      </p:sp>
+      <p:sp>
+        <p:nvSpPr>
+          <p:cNvPr id="5" name="TextBox 4">
+            <a:extLst>
+              <a:ext uri="{FF2B5EF4-FFF2-40B4-BE49-F238E27FC236}">
+                <a16:creationId xmlns:a16="http://schemas.microsoft.com/office/drawing/2014/main" id="{B4B559FD-F27B-3645-A4BD-29CBE57221AE}"/>
+              </a:ext>
+            </a:extLst>
+          </p:cNvPr>
+          <p:cNvSpPr txBox="1"/>
+          <p:nvPr/>
+        </p:nvSpPr>
+        <p:spPr>
+          <a:xfrm>
+            <a:off x="628075" y="1576257"/>
+            <a:ext cx="6908800" cy="5016758"/>
+          </a:xfrm>
+          <a:prstGeom prst="rect">
+            <a:avLst/>
+          </a:prstGeom>
+          <a:noFill/>
+        </p:spPr>
+        <p:txBody>
+          <a:bodyPr wrap="square">
+            <a:spAutoFit/>
+          </a:bodyPr>
+          <a:lstStyle/>
+          <a:p>
+            <a:r>
+              <a:rPr lang="en-US" dirty="0">
+                <a:solidFill>
+                  <a:srgbClr val="CC7832"/>
+                </a:solidFill>
+                <a:effectLst/>
+                <a:latin typeface="Consolas" panose="020B0609020204030204" pitchFamily="49" charset="0"/>
+                <a:cs typeface="Consolas" panose="020B0609020204030204" pitchFamily="49" charset="0"/>
+              </a:rPr>
+              <a:t>public static int </a:t>
+            </a:r>
+            <a:r>
+              <a:rPr lang="en-US" dirty="0" err="1">
+                <a:solidFill>
+                  <a:srgbClr val="FFC66D"/>
+                </a:solidFill>
+                <a:effectLst/>
+                <a:latin typeface="Consolas" panose="020B0609020204030204" pitchFamily="49" charset="0"/>
+                <a:cs typeface="Consolas" panose="020B0609020204030204" pitchFamily="49" charset="0"/>
+              </a:rPr>
+              <a:t>signCheck</a:t>
+            </a:r>
+            <a:r>
+              <a:rPr lang="en-US" dirty="0">
+                <a:latin typeface="Consolas" panose="020B0609020204030204" pitchFamily="49" charset="0"/>
+                <a:cs typeface="Consolas" panose="020B0609020204030204" pitchFamily="49" charset="0"/>
+              </a:rPr>
+              <a:t>(</a:t>
+            </a:r>
+            <a:r>
+              <a:rPr lang="en-US" dirty="0">
+                <a:solidFill>
+                  <a:srgbClr val="CC7832"/>
+                </a:solidFill>
+                <a:effectLst/>
+                <a:latin typeface="Consolas" panose="020B0609020204030204" pitchFamily="49" charset="0"/>
+                <a:cs typeface="Consolas" panose="020B0609020204030204" pitchFamily="49" charset="0"/>
+              </a:rPr>
+              <a:t>int </a:t>
+            </a:r>
+            <a:r>
+              <a:rPr lang="en-US" i="1" dirty="0">
+                <a:solidFill>
+                  <a:srgbClr val="9876AA"/>
+                </a:solidFill>
+                <a:effectLst/>
+                <a:latin typeface="Consolas" panose="020B0609020204030204" pitchFamily="49" charset="0"/>
+                <a:cs typeface="Consolas" panose="020B0609020204030204" pitchFamily="49" charset="0"/>
+              </a:rPr>
+              <a:t>y</a:t>
+            </a:r>
+            <a:r>
+              <a:rPr lang="en-US" dirty="0">
+                <a:latin typeface="Consolas" panose="020B0609020204030204" pitchFamily="49" charset="0"/>
+                <a:cs typeface="Consolas" panose="020B0609020204030204" pitchFamily="49" charset="0"/>
+              </a:rPr>
+              <a:t>) {</a:t>
+            </a:r>
+            <a:br>
+              <a:rPr lang="en-US" dirty="0">
+                <a:latin typeface="Consolas" panose="020B0609020204030204" pitchFamily="49" charset="0"/>
+                <a:cs typeface="Consolas" panose="020B0609020204030204" pitchFamily="49" charset="0"/>
+              </a:rPr>
+            </a:br>
+            <a:r>
+              <a:rPr lang="en-US" dirty="0">
+                <a:latin typeface="Consolas" panose="020B0609020204030204" pitchFamily="49" charset="0"/>
+                <a:cs typeface="Consolas" panose="020B0609020204030204" pitchFamily="49" charset="0"/>
+              </a:rPr>
+              <a:t>    </a:t>
+            </a:r>
+            <a:r>
+              <a:rPr lang="en-US" dirty="0">
+                <a:solidFill>
+                  <a:srgbClr val="CC7832"/>
+                </a:solidFill>
+                <a:effectLst/>
+                <a:latin typeface="Consolas" panose="020B0609020204030204" pitchFamily="49" charset="0"/>
+                <a:cs typeface="Consolas" panose="020B0609020204030204" pitchFamily="49" charset="0"/>
+              </a:rPr>
+              <a:t>int </a:t>
+            </a:r>
+            <a:r>
+              <a:rPr lang="en-US" i="1" dirty="0">
+                <a:solidFill>
+                  <a:srgbClr val="9876AA"/>
+                </a:solidFill>
+                <a:effectLst/>
+                <a:latin typeface="Consolas" panose="020B0609020204030204" pitchFamily="49" charset="0"/>
+                <a:cs typeface="Consolas" panose="020B0609020204030204" pitchFamily="49" charset="0"/>
+              </a:rPr>
+              <a:t>x </a:t>
+            </a:r>
+            <a:r>
+              <a:rPr lang="en-US" dirty="0">
+                <a:latin typeface="Consolas" panose="020B0609020204030204" pitchFamily="49" charset="0"/>
+                <a:cs typeface="Consolas" panose="020B0609020204030204" pitchFamily="49" charset="0"/>
+              </a:rPr>
+              <a:t>= </a:t>
+            </a:r>
+            <a:r>
+              <a:rPr lang="en-US" dirty="0">
+                <a:solidFill>
+                  <a:srgbClr val="6897BB"/>
+                </a:solidFill>
+                <a:effectLst/>
+                <a:latin typeface="Consolas" panose="020B0609020204030204" pitchFamily="49" charset="0"/>
+                <a:cs typeface="Consolas" panose="020B0609020204030204" pitchFamily="49" charset="0"/>
+              </a:rPr>
+              <a:t>0</a:t>
+            </a:r>
+            <a:r>
+              <a:rPr lang="en-US" dirty="0">
+                <a:solidFill>
+                  <a:srgbClr val="CC7832"/>
+                </a:solidFill>
+                <a:effectLst/>
+                <a:latin typeface="Consolas" panose="020B0609020204030204" pitchFamily="49" charset="0"/>
+                <a:cs typeface="Consolas" panose="020B0609020204030204" pitchFamily="49" charset="0"/>
+              </a:rPr>
+              <a:t>;</a:t>
+            </a:r>
+            <a:br>
+              <a:rPr lang="en-US" dirty="0">
+                <a:solidFill>
+                  <a:srgbClr val="CC7832"/>
+                </a:solidFill>
+                <a:effectLst/>
+                <a:latin typeface="Consolas" panose="020B0609020204030204" pitchFamily="49" charset="0"/>
+                <a:cs typeface="Consolas" panose="020B0609020204030204" pitchFamily="49" charset="0"/>
+              </a:rPr>
+            </a:br>
+            <a:r>
+              <a:rPr lang="en-US" dirty="0">
+                <a:solidFill>
+                  <a:srgbClr val="CC7832"/>
+                </a:solidFill>
+                <a:effectLst/>
+                <a:latin typeface="Consolas" panose="020B0609020204030204" pitchFamily="49" charset="0"/>
+                <a:cs typeface="Consolas" panose="020B0609020204030204" pitchFamily="49" charset="0"/>
+              </a:rPr>
+              <a:t>    if</a:t>
+            </a:r>
+            <a:r>
+              <a:rPr lang="en-US" dirty="0">
+                <a:latin typeface="Consolas" panose="020B0609020204030204" pitchFamily="49" charset="0"/>
+                <a:cs typeface="Consolas" panose="020B0609020204030204" pitchFamily="49" charset="0"/>
+              </a:rPr>
+              <a:t>(</a:t>
+            </a:r>
+            <a:r>
+              <a:rPr lang="en-US" i="1" dirty="0">
+                <a:solidFill>
+                  <a:srgbClr val="9876AA"/>
+                </a:solidFill>
+                <a:effectLst/>
+                <a:latin typeface="Consolas" panose="020B0609020204030204" pitchFamily="49" charset="0"/>
+                <a:cs typeface="Consolas" panose="020B0609020204030204" pitchFamily="49" charset="0"/>
+              </a:rPr>
+              <a:t>y </a:t>
+            </a:r>
+            <a:r>
+              <a:rPr lang="en-US" dirty="0">
+                <a:latin typeface="Consolas" panose="020B0609020204030204" pitchFamily="49" charset="0"/>
+                <a:cs typeface="Consolas" panose="020B0609020204030204" pitchFamily="49" charset="0"/>
+              </a:rPr>
+              <a:t>&gt; </a:t>
+            </a:r>
+            <a:r>
+              <a:rPr lang="en-US" i="1" dirty="0">
+                <a:solidFill>
+                  <a:srgbClr val="9876AA"/>
+                </a:solidFill>
+                <a:effectLst/>
+                <a:latin typeface="Consolas" panose="020B0609020204030204" pitchFamily="49" charset="0"/>
+                <a:cs typeface="Consolas" panose="020B0609020204030204" pitchFamily="49" charset="0"/>
+              </a:rPr>
+              <a:t>x</a:t>
+            </a:r>
+            <a:r>
+              <a:rPr lang="en-US" dirty="0">
+                <a:latin typeface="Consolas" panose="020B0609020204030204" pitchFamily="49" charset="0"/>
+                <a:cs typeface="Consolas" panose="020B0609020204030204" pitchFamily="49" charset="0"/>
+              </a:rPr>
+              <a:t>) {</a:t>
+            </a:r>
+            <a:br>
+              <a:rPr lang="en-US" dirty="0">
+                <a:latin typeface="Consolas" panose="020B0609020204030204" pitchFamily="49" charset="0"/>
+                <a:cs typeface="Consolas" panose="020B0609020204030204" pitchFamily="49" charset="0"/>
+              </a:rPr>
+            </a:br>
+            <a:r>
+              <a:rPr lang="en-US" dirty="0">
+                <a:latin typeface="Consolas" panose="020B0609020204030204" pitchFamily="49" charset="0"/>
+                <a:cs typeface="Consolas" panose="020B0609020204030204" pitchFamily="49" charset="0"/>
+              </a:rPr>
+              <a:t>        </a:t>
+            </a:r>
+            <a:r>
+              <a:rPr lang="en-US" i="1" dirty="0">
+                <a:solidFill>
+                  <a:srgbClr val="9876AA"/>
+                </a:solidFill>
+                <a:effectLst/>
+                <a:latin typeface="Consolas" panose="020B0609020204030204" pitchFamily="49" charset="0"/>
+                <a:cs typeface="Consolas" panose="020B0609020204030204" pitchFamily="49" charset="0"/>
+              </a:rPr>
+              <a:t>x </a:t>
+            </a:r>
+            <a:r>
+              <a:rPr lang="en-US" dirty="0">
+                <a:latin typeface="Consolas" panose="020B0609020204030204" pitchFamily="49" charset="0"/>
+                <a:cs typeface="Consolas" panose="020B0609020204030204" pitchFamily="49" charset="0"/>
+              </a:rPr>
+              <a:t>= -</a:t>
+            </a:r>
+            <a:r>
+              <a:rPr lang="en-US" i="1" dirty="0">
+                <a:solidFill>
+                  <a:srgbClr val="9876AA"/>
+                </a:solidFill>
+                <a:effectLst/>
+                <a:latin typeface="Consolas" panose="020B0609020204030204" pitchFamily="49" charset="0"/>
+                <a:cs typeface="Consolas" panose="020B0609020204030204" pitchFamily="49" charset="0"/>
+              </a:rPr>
+              <a:t>y</a:t>
+            </a:r>
+            <a:r>
+              <a:rPr lang="en-US" dirty="0">
+                <a:solidFill>
+                  <a:srgbClr val="CC7832"/>
+                </a:solidFill>
+                <a:effectLst/>
+                <a:latin typeface="Consolas" panose="020B0609020204030204" pitchFamily="49" charset="0"/>
+                <a:cs typeface="Consolas" panose="020B0609020204030204" pitchFamily="49" charset="0"/>
+              </a:rPr>
+              <a:t>;</a:t>
+            </a:r>
+            <a:br>
+              <a:rPr lang="en-US" dirty="0">
+                <a:solidFill>
+                  <a:srgbClr val="CC7832"/>
+                </a:solidFill>
+                <a:effectLst/>
+                <a:latin typeface="Consolas" panose="020B0609020204030204" pitchFamily="49" charset="0"/>
+                <a:cs typeface="Consolas" panose="020B0609020204030204" pitchFamily="49" charset="0"/>
+              </a:rPr>
+            </a:br>
+            <a:r>
+              <a:rPr lang="en-US" dirty="0">
+                <a:solidFill>
+                  <a:srgbClr val="CC7832"/>
+                </a:solidFill>
+                <a:effectLst/>
+                <a:latin typeface="Consolas" panose="020B0609020204030204" pitchFamily="49" charset="0"/>
+                <a:cs typeface="Consolas" panose="020B0609020204030204" pitchFamily="49" charset="0"/>
+              </a:rPr>
+              <a:t>    </a:t>
+            </a:r>
+            <a:r>
+              <a:rPr lang="en-US" dirty="0">
+                <a:latin typeface="Consolas" panose="020B0609020204030204" pitchFamily="49" charset="0"/>
+                <a:cs typeface="Consolas" panose="020B0609020204030204" pitchFamily="49" charset="0"/>
+              </a:rPr>
+              <a:t>}</a:t>
+            </a:r>
+            <a:br>
+              <a:rPr lang="en-US" dirty="0">
+                <a:latin typeface="Consolas" panose="020B0609020204030204" pitchFamily="49" charset="0"/>
+                <a:cs typeface="Consolas" panose="020B0609020204030204" pitchFamily="49" charset="0"/>
+              </a:rPr>
+            </a:br>
+            <a:r>
+              <a:rPr lang="en-US" dirty="0">
+                <a:latin typeface="Consolas" panose="020B0609020204030204" pitchFamily="49" charset="0"/>
+                <a:cs typeface="Consolas" panose="020B0609020204030204" pitchFamily="49" charset="0"/>
+              </a:rPr>
+              <a:t>    </a:t>
+            </a:r>
+            <a:r>
+              <a:rPr lang="en-US" dirty="0">
+                <a:solidFill>
+                  <a:srgbClr val="CC7832"/>
+                </a:solidFill>
+                <a:effectLst/>
+                <a:latin typeface="Consolas" panose="020B0609020204030204" pitchFamily="49" charset="0"/>
+                <a:cs typeface="Consolas" panose="020B0609020204030204" pitchFamily="49" charset="0"/>
+              </a:rPr>
+              <a:t>if</a:t>
+            </a:r>
+            <a:r>
+              <a:rPr lang="en-US" dirty="0">
+                <a:latin typeface="Consolas" panose="020B0609020204030204" pitchFamily="49" charset="0"/>
+                <a:cs typeface="Consolas" panose="020B0609020204030204" pitchFamily="49" charset="0"/>
+              </a:rPr>
+              <a:t>(</a:t>
+            </a:r>
+            <a:r>
+              <a:rPr lang="en-US" i="1" dirty="0">
+                <a:solidFill>
+                  <a:srgbClr val="9876AA"/>
+                </a:solidFill>
+                <a:effectLst/>
+                <a:latin typeface="Consolas" panose="020B0609020204030204" pitchFamily="49" charset="0"/>
+                <a:cs typeface="Consolas" panose="020B0609020204030204" pitchFamily="49" charset="0"/>
+              </a:rPr>
+              <a:t>y </a:t>
+            </a:r>
+            <a:r>
+              <a:rPr lang="en-US" dirty="0">
+                <a:latin typeface="Consolas" panose="020B0609020204030204" pitchFamily="49" charset="0"/>
+                <a:cs typeface="Consolas" panose="020B0609020204030204" pitchFamily="49" charset="0"/>
+              </a:rPr>
+              <a:t>&lt; </a:t>
+            </a:r>
+            <a:r>
+              <a:rPr lang="en-US" i="1" dirty="0">
+                <a:solidFill>
+                  <a:srgbClr val="9876AA"/>
+                </a:solidFill>
+                <a:effectLst/>
+                <a:latin typeface="Consolas" panose="020B0609020204030204" pitchFamily="49" charset="0"/>
+                <a:cs typeface="Consolas" panose="020B0609020204030204" pitchFamily="49" charset="0"/>
+              </a:rPr>
+              <a:t>x</a:t>
+            </a:r>
+            <a:r>
+              <a:rPr lang="en-US" dirty="0">
+                <a:latin typeface="Consolas" panose="020B0609020204030204" pitchFamily="49" charset="0"/>
+                <a:cs typeface="Consolas" panose="020B0609020204030204" pitchFamily="49" charset="0"/>
+              </a:rPr>
+              <a:t>) {</a:t>
+            </a:r>
+            <a:br>
+              <a:rPr lang="en-US" dirty="0">
+                <a:latin typeface="Consolas" panose="020B0609020204030204" pitchFamily="49" charset="0"/>
+                <a:cs typeface="Consolas" panose="020B0609020204030204" pitchFamily="49" charset="0"/>
+              </a:rPr>
+            </a:br>
+            <a:r>
+              <a:rPr lang="en-US" dirty="0">
+                <a:latin typeface="Consolas" panose="020B0609020204030204" pitchFamily="49" charset="0"/>
+                <a:cs typeface="Consolas" panose="020B0609020204030204" pitchFamily="49" charset="0"/>
+              </a:rPr>
+              <a:t>        </a:t>
+            </a:r>
+            <a:r>
+              <a:rPr lang="en-US" i="1" dirty="0">
+                <a:solidFill>
+                  <a:srgbClr val="9876AA"/>
+                </a:solidFill>
+                <a:effectLst/>
+                <a:latin typeface="Consolas" panose="020B0609020204030204" pitchFamily="49" charset="0"/>
+                <a:cs typeface="Consolas" panose="020B0609020204030204" pitchFamily="49" charset="0"/>
+              </a:rPr>
+              <a:t>x </a:t>
+            </a:r>
+            <a:r>
+              <a:rPr lang="en-US" dirty="0">
+                <a:latin typeface="Consolas" panose="020B0609020204030204" pitchFamily="49" charset="0"/>
+                <a:cs typeface="Consolas" panose="020B0609020204030204" pitchFamily="49" charset="0"/>
+              </a:rPr>
+              <a:t>= </a:t>
+            </a:r>
+            <a:r>
+              <a:rPr lang="en-US" i="1" dirty="0">
+                <a:solidFill>
+                  <a:srgbClr val="9876AA"/>
+                </a:solidFill>
+                <a:effectLst/>
+                <a:latin typeface="Consolas" panose="020B0609020204030204" pitchFamily="49" charset="0"/>
+                <a:cs typeface="Consolas" panose="020B0609020204030204" pitchFamily="49" charset="0"/>
+              </a:rPr>
+              <a:t>y</a:t>
+            </a:r>
+            <a:r>
+              <a:rPr lang="en-US" dirty="0">
+                <a:solidFill>
+                  <a:srgbClr val="CC7832"/>
+                </a:solidFill>
+                <a:effectLst/>
+                <a:latin typeface="Consolas" panose="020B0609020204030204" pitchFamily="49" charset="0"/>
+                <a:cs typeface="Consolas" panose="020B0609020204030204" pitchFamily="49" charset="0"/>
+              </a:rPr>
+              <a:t>;</a:t>
+            </a:r>
+            <a:br>
+              <a:rPr lang="en-US" dirty="0">
+                <a:solidFill>
+                  <a:srgbClr val="CC7832"/>
+                </a:solidFill>
+                <a:effectLst/>
+                <a:latin typeface="Consolas" panose="020B0609020204030204" pitchFamily="49" charset="0"/>
+                <a:cs typeface="Consolas" panose="020B0609020204030204" pitchFamily="49" charset="0"/>
+              </a:rPr>
+            </a:br>
+            <a:r>
+              <a:rPr lang="en-US" dirty="0">
+                <a:solidFill>
+                  <a:srgbClr val="CC7832"/>
+                </a:solidFill>
+                <a:effectLst/>
+                <a:latin typeface="Consolas" panose="020B0609020204030204" pitchFamily="49" charset="0"/>
+                <a:cs typeface="Consolas" panose="020B0609020204030204" pitchFamily="49" charset="0"/>
+              </a:rPr>
+              <a:t>    </a:t>
+            </a:r>
+            <a:r>
+              <a:rPr lang="en-US" dirty="0">
+                <a:latin typeface="Consolas" panose="020B0609020204030204" pitchFamily="49" charset="0"/>
+                <a:cs typeface="Consolas" panose="020B0609020204030204" pitchFamily="49" charset="0"/>
+              </a:rPr>
+              <a:t>}</a:t>
+            </a:r>
+            <a:br>
+              <a:rPr lang="en-US" dirty="0">
+                <a:latin typeface="Consolas" panose="020B0609020204030204" pitchFamily="49" charset="0"/>
+                <a:cs typeface="Consolas" panose="020B0609020204030204" pitchFamily="49" charset="0"/>
+              </a:rPr>
+            </a:br>
+            <a:r>
+              <a:rPr lang="en-US" dirty="0">
+                <a:latin typeface="Consolas" panose="020B0609020204030204" pitchFamily="49" charset="0"/>
+                <a:cs typeface="Consolas" panose="020B0609020204030204" pitchFamily="49" charset="0"/>
+              </a:rPr>
+              <a:t>    </a:t>
+            </a:r>
+            <a:r>
+              <a:rPr lang="en-US" dirty="0">
+                <a:solidFill>
+                  <a:srgbClr val="CC7832"/>
+                </a:solidFill>
+                <a:effectLst/>
+                <a:latin typeface="Consolas" panose="020B0609020204030204" pitchFamily="49" charset="0"/>
+                <a:cs typeface="Consolas" panose="020B0609020204030204" pitchFamily="49" charset="0"/>
+              </a:rPr>
+              <a:t>if </a:t>
+            </a:r>
+            <a:r>
+              <a:rPr lang="en-US" dirty="0">
+                <a:latin typeface="Consolas" panose="020B0609020204030204" pitchFamily="49" charset="0"/>
+                <a:cs typeface="Consolas" panose="020B0609020204030204" pitchFamily="49" charset="0"/>
+              </a:rPr>
+              <a:t>(</a:t>
+            </a:r>
+            <a:r>
+              <a:rPr lang="en-US" i="1" dirty="0" err="1">
+                <a:solidFill>
+                  <a:srgbClr val="9876AA"/>
+                </a:solidFill>
+                <a:effectLst/>
+                <a:latin typeface="Consolas" panose="020B0609020204030204" pitchFamily="49" charset="0"/>
+                <a:cs typeface="Consolas" panose="020B0609020204030204" pitchFamily="49" charset="0"/>
+              </a:rPr>
+              <a:t>y</a:t>
+            </a:r>
+            <a:r>
+              <a:rPr lang="en-US" dirty="0" err="1">
+                <a:latin typeface="Consolas" panose="020B0609020204030204" pitchFamily="49" charset="0"/>
+                <a:cs typeface="Consolas" panose="020B0609020204030204" pitchFamily="49" charset="0"/>
+              </a:rPr>
+              <a:t>+</a:t>
+            </a:r>
+            <a:r>
+              <a:rPr lang="en-US" i="1" dirty="0" err="1">
+                <a:solidFill>
+                  <a:srgbClr val="9876AA"/>
+                </a:solidFill>
+                <a:effectLst/>
+                <a:latin typeface="Consolas" panose="020B0609020204030204" pitchFamily="49" charset="0"/>
+                <a:cs typeface="Consolas" panose="020B0609020204030204" pitchFamily="49" charset="0"/>
+              </a:rPr>
+              <a:t>x</a:t>
+            </a:r>
+            <a:r>
+              <a:rPr lang="en-US" i="1" dirty="0">
+                <a:solidFill>
+                  <a:srgbClr val="9876AA"/>
+                </a:solidFill>
+                <a:effectLst/>
+                <a:latin typeface="Consolas" panose="020B0609020204030204" pitchFamily="49" charset="0"/>
+                <a:cs typeface="Consolas" panose="020B0609020204030204" pitchFamily="49" charset="0"/>
+              </a:rPr>
+              <a:t> </a:t>
+            </a:r>
+            <a:r>
+              <a:rPr lang="en-US" dirty="0">
+                <a:latin typeface="Consolas" panose="020B0609020204030204" pitchFamily="49" charset="0"/>
+                <a:cs typeface="Consolas" panose="020B0609020204030204" pitchFamily="49" charset="0"/>
+              </a:rPr>
+              <a:t>&lt; </a:t>
+            </a:r>
+            <a:r>
+              <a:rPr lang="en-US" i="1" dirty="0">
+                <a:solidFill>
+                  <a:srgbClr val="9876AA"/>
+                </a:solidFill>
+                <a:effectLst/>
+                <a:latin typeface="Consolas" panose="020B0609020204030204" pitchFamily="49" charset="0"/>
+                <a:cs typeface="Consolas" panose="020B0609020204030204" pitchFamily="49" charset="0"/>
+              </a:rPr>
+              <a:t>x</a:t>
+            </a:r>
+            <a:r>
+              <a:rPr lang="en-US" dirty="0">
+                <a:latin typeface="Consolas" panose="020B0609020204030204" pitchFamily="49" charset="0"/>
+                <a:cs typeface="Consolas" panose="020B0609020204030204" pitchFamily="49" charset="0"/>
+              </a:rPr>
+              <a:t>) {</a:t>
+            </a:r>
+            <a:br>
+              <a:rPr lang="en-US" dirty="0">
+                <a:latin typeface="Consolas" panose="020B0609020204030204" pitchFamily="49" charset="0"/>
+                <a:cs typeface="Consolas" panose="020B0609020204030204" pitchFamily="49" charset="0"/>
+              </a:rPr>
+            </a:br>
+            <a:r>
+              <a:rPr lang="en-US" dirty="0">
+                <a:latin typeface="Consolas" panose="020B0609020204030204" pitchFamily="49" charset="0"/>
+                <a:cs typeface="Consolas" panose="020B0609020204030204" pitchFamily="49" charset="0"/>
+              </a:rPr>
+              <a:t>        </a:t>
+            </a:r>
+            <a:r>
+              <a:rPr lang="en-US" dirty="0">
+                <a:solidFill>
+                  <a:srgbClr val="CC7832"/>
+                </a:solidFill>
+                <a:effectLst/>
+                <a:latin typeface="Consolas" panose="020B0609020204030204" pitchFamily="49" charset="0"/>
+                <a:cs typeface="Consolas" panose="020B0609020204030204" pitchFamily="49" charset="0"/>
+              </a:rPr>
+              <a:t>return </a:t>
+            </a:r>
+            <a:r>
+              <a:rPr lang="en-US" dirty="0">
+                <a:latin typeface="Consolas" panose="020B0609020204030204" pitchFamily="49" charset="0"/>
+                <a:cs typeface="Consolas" panose="020B0609020204030204" pitchFamily="49" charset="0"/>
+              </a:rPr>
+              <a:t>-</a:t>
+            </a:r>
+            <a:r>
+              <a:rPr lang="en-US" dirty="0">
+                <a:solidFill>
+                  <a:srgbClr val="6897BB"/>
+                </a:solidFill>
+                <a:effectLst/>
+                <a:latin typeface="Consolas" panose="020B0609020204030204" pitchFamily="49" charset="0"/>
+                <a:cs typeface="Consolas" panose="020B0609020204030204" pitchFamily="49" charset="0"/>
+              </a:rPr>
+              <a:t>1</a:t>
+            </a:r>
+            <a:r>
+              <a:rPr lang="en-US" dirty="0">
+                <a:solidFill>
+                  <a:srgbClr val="CC7832"/>
+                </a:solidFill>
+                <a:effectLst/>
+                <a:latin typeface="Consolas" panose="020B0609020204030204" pitchFamily="49" charset="0"/>
+                <a:cs typeface="Consolas" panose="020B0609020204030204" pitchFamily="49" charset="0"/>
+              </a:rPr>
+              <a:t>;</a:t>
+            </a:r>
+            <a:br>
+              <a:rPr lang="en-US" dirty="0">
+                <a:solidFill>
+                  <a:srgbClr val="CC7832"/>
+                </a:solidFill>
+                <a:effectLst/>
+                <a:latin typeface="Consolas" panose="020B0609020204030204" pitchFamily="49" charset="0"/>
+                <a:cs typeface="Consolas" panose="020B0609020204030204" pitchFamily="49" charset="0"/>
+              </a:rPr>
+            </a:br>
+            <a:r>
+              <a:rPr lang="en-US" dirty="0">
+                <a:solidFill>
+                  <a:srgbClr val="CC7832"/>
+                </a:solidFill>
+                <a:effectLst/>
+                <a:latin typeface="Consolas" panose="020B0609020204030204" pitchFamily="49" charset="0"/>
+                <a:cs typeface="Consolas" panose="020B0609020204030204" pitchFamily="49" charset="0"/>
+              </a:rPr>
+              <a:t>    </a:t>
+            </a:r>
+            <a:r>
+              <a:rPr lang="en-US" dirty="0">
+                <a:latin typeface="Consolas" panose="020B0609020204030204" pitchFamily="49" charset="0"/>
+                <a:cs typeface="Consolas" panose="020B0609020204030204" pitchFamily="49" charset="0"/>
+              </a:rPr>
+              <a:t>}</a:t>
+            </a:r>
+            <a:br>
+              <a:rPr lang="en-US" dirty="0">
+                <a:latin typeface="Consolas" panose="020B0609020204030204" pitchFamily="49" charset="0"/>
+                <a:cs typeface="Consolas" panose="020B0609020204030204" pitchFamily="49" charset="0"/>
+              </a:rPr>
+            </a:br>
+            <a:r>
+              <a:rPr lang="en-US" dirty="0">
+                <a:latin typeface="Consolas" panose="020B0609020204030204" pitchFamily="49" charset="0"/>
+                <a:cs typeface="Consolas" panose="020B0609020204030204" pitchFamily="49" charset="0"/>
+              </a:rPr>
+              <a:t>    </a:t>
+            </a:r>
+            <a:r>
+              <a:rPr lang="en-US" dirty="0">
+                <a:solidFill>
+                  <a:srgbClr val="CC7832"/>
+                </a:solidFill>
+                <a:effectLst/>
+                <a:latin typeface="Consolas" panose="020B0609020204030204" pitchFamily="49" charset="0"/>
+                <a:cs typeface="Consolas" panose="020B0609020204030204" pitchFamily="49" charset="0"/>
+              </a:rPr>
+              <a:t>if </a:t>
+            </a:r>
+            <a:r>
+              <a:rPr lang="en-US" dirty="0">
+                <a:latin typeface="Consolas" panose="020B0609020204030204" pitchFamily="49" charset="0"/>
+                <a:cs typeface="Consolas" panose="020B0609020204030204" pitchFamily="49" charset="0"/>
+              </a:rPr>
+              <a:t>(</a:t>
+            </a:r>
+            <a:r>
+              <a:rPr lang="en-US" i="1" dirty="0">
+                <a:solidFill>
+                  <a:srgbClr val="9876AA"/>
+                </a:solidFill>
+                <a:effectLst/>
+                <a:latin typeface="Consolas" panose="020B0609020204030204" pitchFamily="49" charset="0"/>
+                <a:cs typeface="Consolas" panose="020B0609020204030204" pitchFamily="49" charset="0"/>
+              </a:rPr>
+              <a:t>x</a:t>
+            </a:r>
+            <a:r>
+              <a:rPr lang="en-US" dirty="0">
+                <a:latin typeface="Consolas" panose="020B0609020204030204" pitchFamily="49" charset="0"/>
+                <a:cs typeface="Consolas" panose="020B0609020204030204" pitchFamily="49" charset="0"/>
+              </a:rPr>
+              <a:t>-</a:t>
+            </a:r>
+            <a:r>
+              <a:rPr lang="en-US" i="1" dirty="0">
+                <a:solidFill>
+                  <a:srgbClr val="9876AA"/>
+                </a:solidFill>
+                <a:effectLst/>
+                <a:latin typeface="Consolas" panose="020B0609020204030204" pitchFamily="49" charset="0"/>
+                <a:cs typeface="Consolas" panose="020B0609020204030204" pitchFamily="49" charset="0"/>
+              </a:rPr>
+              <a:t>y </a:t>
+            </a:r>
+            <a:r>
+              <a:rPr lang="en-US" dirty="0">
+                <a:latin typeface="Consolas" panose="020B0609020204030204" pitchFamily="49" charset="0"/>
+                <a:cs typeface="Consolas" panose="020B0609020204030204" pitchFamily="49" charset="0"/>
+              </a:rPr>
+              <a:t>&lt; </a:t>
+            </a:r>
+            <a:r>
+              <a:rPr lang="en-US" i="1" dirty="0">
+                <a:solidFill>
+                  <a:srgbClr val="9876AA"/>
+                </a:solidFill>
+                <a:effectLst/>
+                <a:latin typeface="Consolas" panose="020B0609020204030204" pitchFamily="49" charset="0"/>
+                <a:cs typeface="Consolas" panose="020B0609020204030204" pitchFamily="49" charset="0"/>
+              </a:rPr>
+              <a:t>x </a:t>
+            </a:r>
+            <a:r>
+              <a:rPr lang="en-US" dirty="0">
+                <a:latin typeface="Consolas" panose="020B0609020204030204" pitchFamily="49" charset="0"/>
+                <a:cs typeface="Consolas" panose="020B0609020204030204" pitchFamily="49" charset="0"/>
+              </a:rPr>
+              <a:t>) {</a:t>
+            </a:r>
+            <a:br>
+              <a:rPr lang="en-US" dirty="0">
+                <a:latin typeface="Consolas" panose="020B0609020204030204" pitchFamily="49" charset="0"/>
+                <a:cs typeface="Consolas" panose="020B0609020204030204" pitchFamily="49" charset="0"/>
+              </a:rPr>
+            </a:br>
+            <a:r>
+              <a:rPr lang="en-US" dirty="0">
+                <a:latin typeface="Consolas" panose="020B0609020204030204" pitchFamily="49" charset="0"/>
+                <a:cs typeface="Consolas" panose="020B0609020204030204" pitchFamily="49" charset="0"/>
+              </a:rPr>
+              <a:t>        </a:t>
+            </a:r>
+            <a:r>
+              <a:rPr lang="en-US" dirty="0">
+                <a:solidFill>
+                  <a:srgbClr val="CC7832"/>
+                </a:solidFill>
+                <a:effectLst/>
+                <a:latin typeface="Consolas" panose="020B0609020204030204" pitchFamily="49" charset="0"/>
+                <a:cs typeface="Consolas" panose="020B0609020204030204" pitchFamily="49" charset="0"/>
+              </a:rPr>
+              <a:t>return </a:t>
+            </a:r>
+            <a:r>
+              <a:rPr lang="en-US" dirty="0">
+                <a:solidFill>
+                  <a:srgbClr val="6897BB"/>
+                </a:solidFill>
+                <a:effectLst/>
+                <a:latin typeface="Consolas" panose="020B0609020204030204" pitchFamily="49" charset="0"/>
+                <a:cs typeface="Consolas" panose="020B0609020204030204" pitchFamily="49" charset="0"/>
+              </a:rPr>
+              <a:t>1</a:t>
+            </a:r>
+            <a:r>
+              <a:rPr lang="en-US" dirty="0">
+                <a:solidFill>
+                  <a:srgbClr val="CC7832"/>
+                </a:solidFill>
+                <a:effectLst/>
+                <a:latin typeface="Consolas" panose="020B0609020204030204" pitchFamily="49" charset="0"/>
+                <a:cs typeface="Consolas" panose="020B0609020204030204" pitchFamily="49" charset="0"/>
+              </a:rPr>
+              <a:t>;</a:t>
+            </a:r>
+            <a:br>
+              <a:rPr lang="en-US" dirty="0">
+                <a:solidFill>
+                  <a:srgbClr val="CC7832"/>
+                </a:solidFill>
+                <a:effectLst/>
+                <a:latin typeface="Consolas" panose="020B0609020204030204" pitchFamily="49" charset="0"/>
+                <a:cs typeface="Consolas" panose="020B0609020204030204" pitchFamily="49" charset="0"/>
+              </a:rPr>
+            </a:br>
+            <a:r>
+              <a:rPr lang="en-US" dirty="0">
+                <a:solidFill>
+                  <a:srgbClr val="CC7832"/>
+                </a:solidFill>
+                <a:effectLst/>
+                <a:latin typeface="Consolas" panose="020B0609020204030204" pitchFamily="49" charset="0"/>
+                <a:cs typeface="Consolas" panose="020B0609020204030204" pitchFamily="49" charset="0"/>
+              </a:rPr>
+              <a:t>    </a:t>
+            </a:r>
+            <a:r>
+              <a:rPr lang="en-US" dirty="0">
+                <a:latin typeface="Consolas" panose="020B0609020204030204" pitchFamily="49" charset="0"/>
+                <a:cs typeface="Consolas" panose="020B0609020204030204" pitchFamily="49" charset="0"/>
+              </a:rPr>
+              <a:t>}</a:t>
+            </a:r>
+            <a:br>
+              <a:rPr lang="en-US" dirty="0">
+                <a:latin typeface="Consolas" panose="020B0609020204030204" pitchFamily="49" charset="0"/>
+                <a:cs typeface="Consolas" panose="020B0609020204030204" pitchFamily="49" charset="0"/>
+              </a:rPr>
+            </a:br>
+            <a:r>
+              <a:rPr lang="en-US" dirty="0">
+                <a:latin typeface="Consolas" panose="020B0609020204030204" pitchFamily="49" charset="0"/>
+                <a:cs typeface="Consolas" panose="020B0609020204030204" pitchFamily="49" charset="0"/>
+              </a:rPr>
+              <a:t>    </a:t>
+            </a:r>
+            <a:r>
+              <a:rPr lang="en-US" dirty="0">
+                <a:solidFill>
+                  <a:srgbClr val="CC7832"/>
+                </a:solidFill>
+                <a:effectLst/>
+                <a:latin typeface="Consolas" panose="020B0609020204030204" pitchFamily="49" charset="0"/>
+                <a:cs typeface="Consolas" panose="020B0609020204030204" pitchFamily="49" charset="0"/>
+              </a:rPr>
+              <a:t>return </a:t>
+            </a:r>
+            <a:r>
+              <a:rPr lang="en-US" dirty="0">
+                <a:solidFill>
+                  <a:srgbClr val="6897BB"/>
+                </a:solidFill>
+                <a:effectLst/>
+                <a:latin typeface="Consolas" panose="020B0609020204030204" pitchFamily="49" charset="0"/>
+                <a:cs typeface="Consolas" panose="020B0609020204030204" pitchFamily="49" charset="0"/>
+              </a:rPr>
+              <a:t>0</a:t>
+            </a:r>
+            <a:r>
+              <a:rPr lang="en-US" dirty="0">
+                <a:solidFill>
+                  <a:srgbClr val="CC7832"/>
+                </a:solidFill>
+                <a:effectLst/>
+                <a:latin typeface="Consolas" panose="020B0609020204030204" pitchFamily="49" charset="0"/>
+                <a:cs typeface="Consolas" panose="020B0609020204030204" pitchFamily="49" charset="0"/>
+              </a:rPr>
+              <a:t>;</a:t>
+            </a:r>
+            <a:br>
+              <a:rPr lang="en-US" dirty="0">
+                <a:solidFill>
+                  <a:srgbClr val="CC7832"/>
+                </a:solidFill>
+                <a:effectLst/>
+                <a:latin typeface="Consolas" panose="020B0609020204030204" pitchFamily="49" charset="0"/>
+                <a:cs typeface="Consolas" panose="020B0609020204030204" pitchFamily="49" charset="0"/>
+              </a:rPr>
+            </a:br>
+            <a:r>
+              <a:rPr lang="en-US" dirty="0">
+                <a:latin typeface="Consolas" panose="020B0609020204030204" pitchFamily="49" charset="0"/>
+                <a:cs typeface="Consolas" panose="020B0609020204030204" pitchFamily="49" charset="0"/>
+              </a:rPr>
+              <a:t>}</a:t>
+            </a:r>
+          </a:p>
+        </p:txBody>
+      </p:sp>
+      <p:sp>
+        <p:nvSpPr>
+          <p:cNvPr id="7" name="TextBox 6">
+            <a:extLst>
+              <a:ext uri="{FF2B5EF4-FFF2-40B4-BE49-F238E27FC236}">
+                <a16:creationId xmlns:a16="http://schemas.microsoft.com/office/drawing/2014/main" id="{C29FFE73-70F1-3E40-B696-D43F0FE3D7F6}"/>
+              </a:ext>
+            </a:extLst>
+          </p:cNvPr>
+          <p:cNvSpPr txBox="1"/>
+          <p:nvPr/>
+        </p:nvSpPr>
+        <p:spPr>
+          <a:xfrm>
+            <a:off x="6908800" y="1576257"/>
+            <a:ext cx="6032500" cy="1015663"/>
+          </a:xfrm>
+          <a:prstGeom prst="rect">
+            <a:avLst/>
+          </a:prstGeom>
+          <a:noFill/>
+        </p:spPr>
+        <p:txBody>
+          <a:bodyPr wrap="square">
+            <a:spAutoFit/>
+          </a:bodyPr>
+          <a:lstStyle/>
+          <a:p>
+            <a:r>
+              <a:rPr lang="en-US" dirty="0">
+                <a:solidFill>
+                  <a:srgbClr val="CC7832"/>
+                </a:solidFill>
+                <a:effectLst/>
+                <a:latin typeface="Consolas" panose="020B0609020204030204" pitchFamily="49" charset="0"/>
+                <a:cs typeface="Consolas" panose="020B0609020204030204" pitchFamily="49" charset="0"/>
+              </a:rPr>
+              <a:t>public static void </a:t>
+            </a:r>
+            <a:r>
+              <a:rPr lang="en-US" dirty="0">
+                <a:solidFill>
+                  <a:srgbClr val="FFC66D"/>
+                </a:solidFill>
+                <a:effectLst/>
+                <a:latin typeface="Consolas" panose="020B0609020204030204" pitchFamily="49" charset="0"/>
+                <a:cs typeface="Consolas" panose="020B0609020204030204" pitchFamily="49" charset="0"/>
+              </a:rPr>
+              <a:t>main</a:t>
+            </a:r>
+            <a:r>
+              <a:rPr lang="en-US" dirty="0">
+                <a:latin typeface="Consolas" panose="020B0609020204030204" pitchFamily="49" charset="0"/>
+                <a:cs typeface="Consolas" panose="020B0609020204030204" pitchFamily="49" charset="0"/>
+              </a:rPr>
+              <a:t>(String[] </a:t>
+            </a:r>
+            <a:r>
+              <a:rPr lang="en-US" i="1" dirty="0" err="1">
+                <a:solidFill>
+                  <a:srgbClr val="9876AA"/>
+                </a:solidFill>
+                <a:effectLst/>
+                <a:latin typeface="Consolas" panose="020B0609020204030204" pitchFamily="49" charset="0"/>
+                <a:cs typeface="Consolas" panose="020B0609020204030204" pitchFamily="49" charset="0"/>
+              </a:rPr>
+              <a:t>args</a:t>
+            </a:r>
+            <a:r>
+              <a:rPr lang="en-US" dirty="0">
+                <a:latin typeface="Consolas" panose="020B0609020204030204" pitchFamily="49" charset="0"/>
+                <a:cs typeface="Consolas" panose="020B0609020204030204" pitchFamily="49" charset="0"/>
+              </a:rPr>
+              <a:t>){</a:t>
+            </a:r>
+            <a:br>
+              <a:rPr lang="en-US" dirty="0">
+                <a:latin typeface="Consolas" panose="020B0609020204030204" pitchFamily="49" charset="0"/>
+                <a:cs typeface="Consolas" panose="020B0609020204030204" pitchFamily="49" charset="0"/>
+              </a:rPr>
+            </a:br>
+            <a:r>
+              <a:rPr lang="en-US" dirty="0">
+                <a:latin typeface="Consolas" panose="020B0609020204030204" pitchFamily="49" charset="0"/>
+                <a:cs typeface="Consolas" panose="020B0609020204030204" pitchFamily="49" charset="0"/>
+              </a:rPr>
+              <a:t>    </a:t>
+            </a:r>
+            <a:r>
+              <a:rPr lang="en-US" dirty="0" err="1">
+                <a:latin typeface="Consolas" panose="020B0609020204030204" pitchFamily="49" charset="0"/>
+                <a:cs typeface="Consolas" panose="020B0609020204030204" pitchFamily="49" charset="0"/>
+              </a:rPr>
+              <a:t>System.</a:t>
+            </a:r>
+            <a:r>
+              <a:rPr lang="en-US" i="1" dirty="0" err="1">
+                <a:solidFill>
+                  <a:srgbClr val="9876AA"/>
+                </a:solidFill>
+                <a:effectLst/>
+                <a:latin typeface="Consolas" panose="020B0609020204030204" pitchFamily="49" charset="0"/>
+                <a:cs typeface="Consolas" panose="020B0609020204030204" pitchFamily="49" charset="0"/>
+              </a:rPr>
+              <a:t>out</a:t>
+            </a:r>
+            <a:r>
+              <a:rPr lang="en-US" dirty="0" err="1">
+                <a:latin typeface="Consolas" panose="020B0609020204030204" pitchFamily="49" charset="0"/>
+                <a:cs typeface="Consolas" panose="020B0609020204030204" pitchFamily="49" charset="0"/>
+              </a:rPr>
+              <a:t>.println</a:t>
+            </a:r>
+            <a:r>
+              <a:rPr lang="en-US" dirty="0">
+                <a:latin typeface="Consolas" panose="020B0609020204030204" pitchFamily="49" charset="0"/>
+                <a:cs typeface="Consolas" panose="020B0609020204030204" pitchFamily="49" charset="0"/>
+              </a:rPr>
+              <a:t>(</a:t>
+            </a:r>
+            <a:r>
+              <a:rPr lang="en-US" i="1" dirty="0" err="1">
+                <a:effectLst/>
+                <a:latin typeface="Consolas" panose="020B0609020204030204" pitchFamily="49" charset="0"/>
+                <a:cs typeface="Consolas" panose="020B0609020204030204" pitchFamily="49" charset="0"/>
+              </a:rPr>
+              <a:t>signCheck</a:t>
+            </a:r>
+            <a:r>
+              <a:rPr lang="en-US" dirty="0">
+                <a:latin typeface="Consolas" panose="020B0609020204030204" pitchFamily="49" charset="0"/>
+                <a:cs typeface="Consolas" panose="020B0609020204030204" pitchFamily="49" charset="0"/>
+              </a:rPr>
+              <a:t>(</a:t>
+            </a:r>
+            <a:r>
+              <a:rPr lang="en-US" dirty="0">
+                <a:solidFill>
+                  <a:srgbClr val="6897BB"/>
+                </a:solidFill>
+                <a:effectLst/>
+                <a:latin typeface="Consolas" panose="020B0609020204030204" pitchFamily="49" charset="0"/>
+                <a:cs typeface="Consolas" panose="020B0609020204030204" pitchFamily="49" charset="0"/>
+              </a:rPr>
+              <a:t>0</a:t>
+            </a:r>
+            <a:r>
+              <a:rPr lang="en-US" dirty="0">
+                <a:latin typeface="Consolas" panose="020B0609020204030204" pitchFamily="49" charset="0"/>
+                <a:cs typeface="Consolas" panose="020B0609020204030204" pitchFamily="49" charset="0"/>
+              </a:rPr>
+              <a:t>))</a:t>
+            </a:r>
+            <a:r>
+              <a:rPr lang="en-US" dirty="0">
+                <a:solidFill>
+                  <a:srgbClr val="CC7832"/>
+                </a:solidFill>
+                <a:effectLst/>
+                <a:latin typeface="Consolas" panose="020B0609020204030204" pitchFamily="49" charset="0"/>
+                <a:cs typeface="Consolas" panose="020B0609020204030204" pitchFamily="49" charset="0"/>
+              </a:rPr>
+              <a:t>;</a:t>
+            </a:r>
+            <a:br>
+              <a:rPr lang="en-US" dirty="0">
+                <a:solidFill>
+                  <a:srgbClr val="CC7832"/>
+                </a:solidFill>
+                <a:effectLst/>
+                <a:latin typeface="Consolas" panose="020B0609020204030204" pitchFamily="49" charset="0"/>
+                <a:cs typeface="Consolas" panose="020B0609020204030204" pitchFamily="49" charset="0"/>
+              </a:rPr>
+            </a:br>
+            <a:r>
+              <a:rPr lang="en-US" dirty="0">
+                <a:latin typeface="Consolas" panose="020B0609020204030204" pitchFamily="49" charset="0"/>
+                <a:cs typeface="Consolas" panose="020B0609020204030204" pitchFamily="49" charset="0"/>
+              </a:rPr>
+              <a:t>}</a:t>
+            </a:r>
+          </a:p>
+        </p:txBody>
+      </p:sp>
+    </p:spTree>
+    <p:extLst>
+      <p:ext uri="{BB962C8B-B14F-4D97-AF65-F5344CB8AC3E}">
+        <p14:creationId xmlns:p14="http://schemas.microsoft.com/office/powerpoint/2010/main" val="43283813"/>
+      </p:ext>
+    </p:extLst>
+  </p:cSld>
+  <p:clrMapOvr>
+    <a:masterClrMapping/>
+  </p:clrMapOvr>
+  <mc:AlternateContent xmlns:mc="http://schemas.openxmlformats.org/markup-compatibility/2006" xmlns:p14="http://schemas.microsoft.com/office/powerpoint/2010/main">
+    <mc:Choice Requires="p14">
+      <p:transition p14:dur="300">
+        <p:fade/>
+      </p:transition>
+    </mc:Choice>
+    <mc:Fallback xmlns="">
+      <p:transition>
+        <p:fade/>
+      </p:transition>
+    </mc:Fallback>
+  </mc:AlternateContent>
+</p:sld>
+</file>
+
+<file path=ppt/slides/slide4.xml><?xml version="1.0" encoding="utf-8"?>
 <p:sld xmlns:a="http://schemas.openxmlformats.org/drawingml/2006/main" xmlns:r="http://schemas.openxmlformats.org/officeDocument/2006/relationships" xmlns:p="http://schemas.openxmlformats.org/presentationml/2006/main">
   <p:cSld>
     <p:spTree>
@@ -6910,7 +9054,7 @@
 </p:sld>
 </file>
 
-<file path=ppt/slides/slide3.xml><?xml version="1.0" encoding="utf-8"?>
+<file path=ppt/slides/slide5.xml><?xml version="1.0" encoding="utf-8"?>
 <p:sld xmlns:a="http://schemas.openxmlformats.org/drawingml/2006/main" xmlns:r="http://schemas.openxmlformats.org/officeDocument/2006/relationships" xmlns:p="http://schemas.openxmlformats.org/presentationml/2006/main">
   <p:cSld>
     <p:spTree>
@@ -7887,7 +10031,7 @@
 </p:sld>
 </file>
 
-<file path=ppt/slides/slide4.xml><?xml version="1.0" encoding="utf-8"?>
+<file path=ppt/slides/slide6.xml><?xml version="1.0" encoding="utf-8"?>
 <p:sld xmlns:a="http://schemas.openxmlformats.org/drawingml/2006/main" xmlns:r="http://schemas.openxmlformats.org/officeDocument/2006/relationships" xmlns:p="http://schemas.openxmlformats.org/presentationml/2006/main">
   <p:cSld>
     <p:spTree>
@@ -8627,7 +10771,7 @@
 </p:sld>
 </file>
 
-<file path=ppt/slides/slide5.xml><?xml version="1.0" encoding="utf-8"?>
+<file path=ppt/slides/slide7.xml><?xml version="1.0" encoding="utf-8"?>
 <p:sld xmlns:a="http://schemas.openxmlformats.org/drawingml/2006/main" xmlns:r="http://schemas.openxmlformats.org/officeDocument/2006/relationships" xmlns:p="http://schemas.openxmlformats.org/presentationml/2006/main">
   <p:cSld>
     <p:spTree>
@@ -8998,7 +11142,7 @@
 </p:sld>
 </file>
 
-<file path=ppt/slides/slide6.xml><?xml version="1.0" encoding="utf-8"?>
+<file path=ppt/slides/slide8.xml><?xml version="1.0" encoding="utf-8"?>
 <p:sld xmlns:a="http://schemas.openxmlformats.org/drawingml/2006/main" xmlns:r="http://schemas.openxmlformats.org/officeDocument/2006/relationships" xmlns:p="http://schemas.openxmlformats.org/presentationml/2006/main">
   <p:cSld>
     <p:spTree>
@@ -10485,7 +12629,7 @@
 </p:sld>
 </file>
 
-<file path=ppt/slides/slide7.xml><?xml version="1.0" encoding="utf-8"?>
+<file path=ppt/slides/slide9.xml><?xml version="1.0" encoding="utf-8"?>
 <p:sld xmlns:a="http://schemas.openxmlformats.org/drawingml/2006/main" xmlns:r="http://schemas.openxmlformats.org/officeDocument/2006/relationships" xmlns:p="http://schemas.openxmlformats.org/presentationml/2006/main">
   <p:cSld>
     <p:spTree>
@@ -10507,7 +12651,7 @@
           <p:cNvPr id="2" name="Title 1">
             <a:extLst>
               <a:ext uri="{FF2B5EF4-FFF2-40B4-BE49-F238E27FC236}">
-                <a16:creationId xmlns:a16="http://schemas.microsoft.com/office/drawing/2014/main" id="{8A960FE9-0770-C34E-A6A1-30B718ADCE1A}"/>
+                <a16:creationId xmlns:a16="http://schemas.microsoft.com/office/drawing/2014/main" id="{63420226-FDB6-7544-AA77-83C2EABED697}"/>
               </a:ext>
             </a:extLst>
           </p:cNvPr>
@@ -10525,172 +12669,1198 @@
           <a:p>
             <a:r>
               <a:rPr lang="en-US" dirty="0"/>
-              <a:t>Review</a:t>
+              <a:t>Group Activity – Draw the Tree</a:t>
             </a:r>
           </a:p>
         </p:txBody>
       </p:sp>
       <p:sp>
         <p:nvSpPr>
-          <p:cNvPr id="3" name="Text Placeholder 2">
+          <p:cNvPr id="5" name="TextBox 4">
             <a:extLst>
               <a:ext uri="{FF2B5EF4-FFF2-40B4-BE49-F238E27FC236}">
-                <a16:creationId xmlns:a16="http://schemas.microsoft.com/office/drawing/2014/main" id="{58623002-8530-7041-8EE6-F33173423322}"/>
+                <a16:creationId xmlns:a16="http://schemas.microsoft.com/office/drawing/2014/main" id="{9A32EE5F-E99E-254F-9537-8235609D18AD}"/>
               </a:ext>
             </a:extLst>
           </p:cNvPr>
-          <p:cNvSpPr>
-            <a:spLocks noGrp="1"/>
-          </p:cNvSpPr>
-          <p:nvPr>
-            <p:ph type="body" sz="quarter" idx="10"/>
-          </p:nvPr>
+          <p:cNvSpPr txBox="1"/>
+          <p:nvPr/>
         </p:nvSpPr>
         <p:spPr>
           <a:xfrm>
-            <a:off x="628075" y="1776683"/>
-            <a:ext cx="12561453" cy="5405839"/>
+            <a:off x="2279650" y="1652118"/>
+            <a:ext cx="9258300" cy="5262979"/>
           </a:xfrm>
+          <a:prstGeom prst="rect">
+            <a:avLst/>
+          </a:prstGeom>
+          <a:noFill/>
         </p:spPr>
         <p:txBody>
-          <a:bodyPr/>
+          <a:bodyPr wrap="square">
+            <a:spAutoFit/>
+          </a:bodyPr>
           <a:lstStyle/>
           <a:p>
             <a:r>
-              <a:rPr lang="en-US" dirty="0"/>
-              <a:t>Conditional operators compare </a:t>
-            </a:r>
-            <a:r>
-              <a:rPr lang="en-US" b="1" dirty="0"/>
-              <a:t>primitives</a:t>
-            </a:r>
-            <a:r>
-              <a:rPr lang="en-US" dirty="0"/>
-              <a:t> to evaluate to </a:t>
-            </a:r>
-            <a:r>
-              <a:rPr lang="en-US" b="1" dirty="0"/>
-              <a:t>true </a:t>
-            </a:r>
-            <a:r>
-              <a:rPr lang="en-US" dirty="0"/>
-              <a:t>or </a:t>
-            </a:r>
-            <a:r>
-              <a:rPr lang="en-US" b="1" dirty="0"/>
-              <a:t>false</a:t>
-            </a:r>
-          </a:p>
-          <a:p>
-            <a:pPr lvl="1" fontAlgn="base"/>
-            <a:r>
-              <a:rPr lang="en-US" dirty="0"/>
-              <a:t>==   Equals</a:t>
-            </a:r>
-          </a:p>
-          <a:p>
-            <a:pPr lvl="1" fontAlgn="base"/>
-            <a:r>
-              <a:rPr lang="en-US" dirty="0"/>
-              <a:t>&lt;     Less than (is left less than right)</a:t>
-            </a:r>
-          </a:p>
-          <a:p>
-            <a:pPr lvl="1" fontAlgn="base"/>
-            <a:r>
-              <a:rPr lang="en-US" dirty="0"/>
-              <a:t>&gt;     Greater than</a:t>
-            </a:r>
-          </a:p>
-          <a:p>
-            <a:pPr lvl="1" fontAlgn="base"/>
-            <a:r>
-              <a:rPr lang="en-US" dirty="0"/>
-              <a:t>&lt;=   Less than OR equal</a:t>
-            </a:r>
-          </a:p>
-          <a:p>
-            <a:pPr lvl="1" fontAlgn="base"/>
-            <a:r>
-              <a:rPr lang="en-US" dirty="0"/>
-              <a:t>&gt;=   Greater than OR equal</a:t>
-            </a:r>
-          </a:p>
-          <a:p>
-            <a:pPr lvl="1" fontAlgn="base"/>
-            <a:r>
-              <a:rPr lang="en-US" dirty="0"/>
-              <a:t>!=    NOT equal ( ! is your NOT character)</a:t>
-            </a:r>
-          </a:p>
-          <a:p>
-            <a:pPr fontAlgn="base"/>
-            <a:r>
-              <a:rPr lang="en-US" dirty="0"/>
-              <a:t>if statements execute a block of code, if </a:t>
-            </a:r>
-            <a:r>
-              <a:rPr lang="en-US" b="1" dirty="0"/>
-              <a:t>true</a:t>
-            </a:r>
-            <a:r>
-              <a:rPr lang="en-US" dirty="0"/>
-              <a:t> in the condition </a:t>
-            </a:r>
-          </a:p>
-          <a:p>
-            <a:pPr fontAlgn="base"/>
-            <a:r>
-              <a:rPr lang="en-US" dirty="0"/>
-              <a:t>else statements execute a block of code, if </a:t>
-            </a:r>
-            <a:r>
-              <a:rPr lang="en-US" b="1" dirty="0"/>
-              <a:t>false</a:t>
-            </a:r>
-            <a:r>
-              <a:rPr lang="en-US" dirty="0"/>
-              <a:t> in an if condition (else is optional)</a:t>
-            </a:r>
-          </a:p>
-          <a:p>
-            <a:pPr fontAlgn="base"/>
-            <a:r>
-              <a:rPr lang="en-US" dirty="0"/>
-              <a:t>Practice </a:t>
-            </a:r>
-            <a:r>
-              <a:rPr lang="en-US" b="1" dirty="0"/>
-              <a:t>drawing</a:t>
-            </a:r>
-            <a:r>
-              <a:rPr lang="en-US" dirty="0"/>
-              <a:t> the tree!!</a:t>
-            </a:r>
-          </a:p>
-          <a:p>
-            <a:pPr lvl="1" fontAlgn="base"/>
-            <a:r>
-              <a:rPr lang="en-US" dirty="0"/>
-              <a:t>Really, makes them a lot easier, especially when nested</a:t>
-            </a:r>
-          </a:p>
-          <a:p>
-            <a:pPr lvl="1" fontAlgn="base"/>
-            <a:r>
-              <a:rPr lang="en-US" dirty="0"/>
-              <a:t>“never the two shall pass”</a:t>
-            </a:r>
-          </a:p>
-          <a:p>
-            <a:endParaRPr lang="en-US" dirty="0"/>
+              <a:rPr lang="en-US" sz="1600" dirty="0">
+                <a:solidFill>
+                  <a:srgbClr val="CC7832"/>
+                </a:solidFill>
+                <a:effectLst/>
+                <a:latin typeface="Consolas" panose="020B0609020204030204" pitchFamily="49" charset="0"/>
+                <a:cs typeface="Consolas" panose="020B0609020204030204" pitchFamily="49" charset="0"/>
+              </a:rPr>
+              <a:t>public </a:t>
+            </a:r>
+            <a:r>
+              <a:rPr lang="en-US" sz="1600" dirty="0">
+                <a:latin typeface="Consolas" panose="020B0609020204030204" pitchFamily="49" charset="0"/>
+                <a:cs typeface="Consolas" panose="020B0609020204030204" pitchFamily="49" charset="0"/>
+              </a:rPr>
+              <a:t>String </a:t>
+            </a:r>
+            <a:r>
+              <a:rPr lang="en-US" sz="1600" dirty="0" err="1">
+                <a:solidFill>
+                  <a:srgbClr val="FFC66D"/>
+                </a:solidFill>
+                <a:effectLst/>
+                <a:latin typeface="Consolas" panose="020B0609020204030204" pitchFamily="49" charset="0"/>
+                <a:cs typeface="Consolas" panose="020B0609020204030204" pitchFamily="49" charset="0"/>
+              </a:rPr>
+              <a:t>branchingCheck</a:t>
+            </a:r>
+            <a:r>
+              <a:rPr lang="en-US" sz="1600" dirty="0">
+                <a:latin typeface="Consolas" panose="020B0609020204030204" pitchFamily="49" charset="0"/>
+                <a:cs typeface="Consolas" panose="020B0609020204030204" pitchFamily="49" charset="0"/>
+              </a:rPr>
+              <a:t>(</a:t>
+            </a:r>
+            <a:r>
+              <a:rPr lang="en-US" sz="1600" dirty="0">
+                <a:solidFill>
+                  <a:srgbClr val="CC7832"/>
+                </a:solidFill>
+                <a:effectLst/>
+                <a:latin typeface="Consolas" panose="020B0609020204030204" pitchFamily="49" charset="0"/>
+                <a:cs typeface="Consolas" panose="020B0609020204030204" pitchFamily="49" charset="0"/>
+              </a:rPr>
+              <a:t>int </a:t>
+            </a:r>
+            <a:r>
+              <a:rPr lang="en-US" sz="1600" i="1" dirty="0" err="1">
+                <a:solidFill>
+                  <a:srgbClr val="9876AA"/>
+                </a:solidFill>
+                <a:effectLst/>
+                <a:latin typeface="Consolas" panose="020B0609020204030204" pitchFamily="49" charset="0"/>
+                <a:cs typeface="Consolas" panose="020B0609020204030204" pitchFamily="49" charset="0"/>
+              </a:rPr>
+              <a:t>valOne</a:t>
+            </a:r>
+            <a:r>
+              <a:rPr lang="en-US" sz="1600" dirty="0">
+                <a:solidFill>
+                  <a:srgbClr val="CC7832"/>
+                </a:solidFill>
+                <a:effectLst/>
+                <a:latin typeface="Consolas" panose="020B0609020204030204" pitchFamily="49" charset="0"/>
+                <a:cs typeface="Consolas" panose="020B0609020204030204" pitchFamily="49" charset="0"/>
+              </a:rPr>
+              <a:t>, int </a:t>
+            </a:r>
+            <a:r>
+              <a:rPr lang="en-US" sz="1600" i="1" dirty="0" err="1">
+                <a:solidFill>
+                  <a:srgbClr val="9876AA"/>
+                </a:solidFill>
+                <a:effectLst/>
+                <a:latin typeface="Consolas" panose="020B0609020204030204" pitchFamily="49" charset="0"/>
+                <a:cs typeface="Consolas" panose="020B0609020204030204" pitchFamily="49" charset="0"/>
+              </a:rPr>
+              <a:t>valTwo</a:t>
+            </a:r>
+            <a:r>
+              <a:rPr lang="en-US" sz="1600" dirty="0">
+                <a:solidFill>
+                  <a:srgbClr val="CC7832"/>
+                </a:solidFill>
+                <a:effectLst/>
+                <a:latin typeface="Consolas" panose="020B0609020204030204" pitchFamily="49" charset="0"/>
+                <a:cs typeface="Consolas" panose="020B0609020204030204" pitchFamily="49" charset="0"/>
+              </a:rPr>
+              <a:t>, int </a:t>
+            </a:r>
+            <a:r>
+              <a:rPr lang="en-US" sz="1600" i="1" dirty="0" err="1">
+                <a:solidFill>
+                  <a:srgbClr val="9876AA"/>
+                </a:solidFill>
+                <a:effectLst/>
+                <a:latin typeface="Consolas" panose="020B0609020204030204" pitchFamily="49" charset="0"/>
+                <a:cs typeface="Consolas" panose="020B0609020204030204" pitchFamily="49" charset="0"/>
+              </a:rPr>
+              <a:t>valThree</a:t>
+            </a:r>
+            <a:r>
+              <a:rPr lang="en-US" sz="1600" dirty="0">
+                <a:latin typeface="Consolas" panose="020B0609020204030204" pitchFamily="49" charset="0"/>
+                <a:cs typeface="Consolas" panose="020B0609020204030204" pitchFamily="49" charset="0"/>
+              </a:rPr>
+              <a:t>) {</a:t>
+            </a:r>
+            <a:br>
+              <a:rPr lang="en-US" sz="1600" dirty="0">
+                <a:latin typeface="Consolas" panose="020B0609020204030204" pitchFamily="49" charset="0"/>
+                <a:cs typeface="Consolas" panose="020B0609020204030204" pitchFamily="49" charset="0"/>
+              </a:rPr>
+            </a:br>
+            <a:br>
+              <a:rPr lang="en-US" sz="1600" dirty="0">
+                <a:latin typeface="Consolas" panose="020B0609020204030204" pitchFamily="49" charset="0"/>
+                <a:cs typeface="Consolas" panose="020B0609020204030204" pitchFamily="49" charset="0"/>
+              </a:rPr>
+            </a:br>
+            <a:r>
+              <a:rPr lang="en-US" sz="1600" dirty="0">
+                <a:latin typeface="Consolas" panose="020B0609020204030204" pitchFamily="49" charset="0"/>
+                <a:cs typeface="Consolas" panose="020B0609020204030204" pitchFamily="49" charset="0"/>
+              </a:rPr>
+              <a:t>    </a:t>
+            </a:r>
+            <a:r>
+              <a:rPr lang="en-US" sz="1600" dirty="0">
+                <a:solidFill>
+                  <a:srgbClr val="CC7832"/>
+                </a:solidFill>
+                <a:effectLst/>
+                <a:latin typeface="Consolas" panose="020B0609020204030204" pitchFamily="49" charset="0"/>
+                <a:cs typeface="Consolas" panose="020B0609020204030204" pitchFamily="49" charset="0"/>
+              </a:rPr>
+              <a:t>double </a:t>
+            </a:r>
+            <a:r>
+              <a:rPr lang="en-US" sz="1600" i="1" dirty="0">
+                <a:solidFill>
+                  <a:srgbClr val="9876AA"/>
+                </a:solidFill>
+                <a:effectLst/>
+                <a:latin typeface="Consolas" panose="020B0609020204030204" pitchFamily="49" charset="0"/>
+                <a:cs typeface="Consolas" panose="020B0609020204030204" pitchFamily="49" charset="0"/>
+              </a:rPr>
+              <a:t>pi </a:t>
+            </a:r>
+            <a:r>
+              <a:rPr lang="en-US" sz="1600" dirty="0">
+                <a:latin typeface="Consolas" panose="020B0609020204030204" pitchFamily="49" charset="0"/>
+                <a:cs typeface="Consolas" panose="020B0609020204030204" pitchFamily="49" charset="0"/>
+              </a:rPr>
+              <a:t>= </a:t>
+            </a:r>
+            <a:r>
+              <a:rPr lang="en-US" sz="1600" dirty="0">
+                <a:solidFill>
+                  <a:srgbClr val="6897BB"/>
+                </a:solidFill>
+                <a:effectLst/>
+                <a:latin typeface="Consolas" panose="020B0609020204030204" pitchFamily="49" charset="0"/>
+                <a:cs typeface="Consolas" panose="020B0609020204030204" pitchFamily="49" charset="0"/>
+              </a:rPr>
+              <a:t>3.14</a:t>
+            </a:r>
+            <a:r>
+              <a:rPr lang="en-US" sz="1600" dirty="0">
+                <a:solidFill>
+                  <a:srgbClr val="CC7832"/>
+                </a:solidFill>
+                <a:effectLst/>
+                <a:latin typeface="Consolas" panose="020B0609020204030204" pitchFamily="49" charset="0"/>
+                <a:cs typeface="Consolas" panose="020B0609020204030204" pitchFamily="49" charset="0"/>
+              </a:rPr>
+              <a:t>;</a:t>
+            </a:r>
+            <a:br>
+              <a:rPr lang="en-US" sz="1600" dirty="0">
+                <a:solidFill>
+                  <a:srgbClr val="CC7832"/>
+                </a:solidFill>
+                <a:effectLst/>
+                <a:latin typeface="Consolas" panose="020B0609020204030204" pitchFamily="49" charset="0"/>
+                <a:cs typeface="Consolas" panose="020B0609020204030204" pitchFamily="49" charset="0"/>
+              </a:rPr>
+            </a:br>
+            <a:r>
+              <a:rPr lang="en-US" sz="1600" dirty="0">
+                <a:solidFill>
+                  <a:srgbClr val="CC7832"/>
+                </a:solidFill>
+                <a:effectLst/>
+                <a:latin typeface="Consolas" panose="020B0609020204030204" pitchFamily="49" charset="0"/>
+                <a:cs typeface="Consolas" panose="020B0609020204030204" pitchFamily="49" charset="0"/>
+              </a:rPr>
+              <a:t>    </a:t>
+            </a:r>
+            <a:r>
+              <a:rPr lang="en-US" sz="1600" dirty="0">
+                <a:latin typeface="Consolas" panose="020B0609020204030204" pitchFamily="49" charset="0"/>
+                <a:cs typeface="Consolas" panose="020B0609020204030204" pitchFamily="49" charset="0"/>
+              </a:rPr>
+              <a:t>String </a:t>
+            </a:r>
+            <a:r>
+              <a:rPr lang="en-US" sz="1600" i="1" dirty="0" err="1">
+                <a:solidFill>
+                  <a:srgbClr val="9876AA"/>
+                </a:solidFill>
+                <a:effectLst/>
+                <a:latin typeface="Consolas" panose="020B0609020204030204" pitchFamily="49" charset="0"/>
+                <a:cs typeface="Consolas" panose="020B0609020204030204" pitchFamily="49" charset="0"/>
+              </a:rPr>
+              <a:t>hasPie</a:t>
+            </a:r>
+            <a:r>
+              <a:rPr lang="en-US" sz="1600" i="1" dirty="0">
+                <a:solidFill>
+                  <a:srgbClr val="9876AA"/>
+                </a:solidFill>
+                <a:effectLst/>
+                <a:latin typeface="Consolas" panose="020B0609020204030204" pitchFamily="49" charset="0"/>
+                <a:cs typeface="Consolas" panose="020B0609020204030204" pitchFamily="49" charset="0"/>
+              </a:rPr>
+              <a:t> </a:t>
+            </a:r>
+            <a:r>
+              <a:rPr lang="en-US" sz="1600" dirty="0">
+                <a:latin typeface="Consolas" panose="020B0609020204030204" pitchFamily="49" charset="0"/>
+                <a:cs typeface="Consolas" panose="020B0609020204030204" pitchFamily="49" charset="0"/>
+              </a:rPr>
+              <a:t>= </a:t>
+            </a:r>
+            <a:r>
+              <a:rPr lang="en-US" sz="1600" dirty="0">
+                <a:solidFill>
+                  <a:srgbClr val="6A8759"/>
+                </a:solidFill>
+                <a:effectLst/>
+                <a:latin typeface="Consolas" panose="020B0609020204030204" pitchFamily="49" charset="0"/>
+                <a:cs typeface="Consolas" panose="020B0609020204030204" pitchFamily="49" charset="0"/>
+              </a:rPr>
+              <a:t>"I like pie"</a:t>
+            </a:r>
+            <a:r>
+              <a:rPr lang="en-US" sz="1600" dirty="0">
+                <a:solidFill>
+                  <a:srgbClr val="CC7832"/>
+                </a:solidFill>
+                <a:effectLst/>
+                <a:latin typeface="Consolas" panose="020B0609020204030204" pitchFamily="49" charset="0"/>
+                <a:cs typeface="Consolas" panose="020B0609020204030204" pitchFamily="49" charset="0"/>
+              </a:rPr>
+              <a:t>;</a:t>
+            </a:r>
+            <a:br>
+              <a:rPr lang="en-US" sz="1600" dirty="0">
+                <a:solidFill>
+                  <a:srgbClr val="CC7832"/>
+                </a:solidFill>
+                <a:effectLst/>
+                <a:latin typeface="Consolas" panose="020B0609020204030204" pitchFamily="49" charset="0"/>
+                <a:cs typeface="Consolas" panose="020B0609020204030204" pitchFamily="49" charset="0"/>
+              </a:rPr>
+            </a:br>
+            <a:r>
+              <a:rPr lang="en-US" sz="1600" dirty="0">
+                <a:solidFill>
+                  <a:srgbClr val="CC7832"/>
+                </a:solidFill>
+                <a:effectLst/>
+                <a:latin typeface="Consolas" panose="020B0609020204030204" pitchFamily="49" charset="0"/>
+                <a:cs typeface="Consolas" panose="020B0609020204030204" pitchFamily="49" charset="0"/>
+              </a:rPr>
+              <a:t>    </a:t>
+            </a:r>
+            <a:r>
+              <a:rPr lang="en-US" sz="1600" dirty="0">
+                <a:latin typeface="Consolas" panose="020B0609020204030204" pitchFamily="49" charset="0"/>
+                <a:cs typeface="Consolas" panose="020B0609020204030204" pitchFamily="49" charset="0"/>
+              </a:rPr>
+              <a:t>String </a:t>
+            </a:r>
+            <a:r>
+              <a:rPr lang="en-US" sz="1600" i="1" dirty="0" err="1">
+                <a:solidFill>
+                  <a:srgbClr val="9876AA"/>
+                </a:solidFill>
+                <a:effectLst/>
+                <a:latin typeface="Consolas" panose="020B0609020204030204" pitchFamily="49" charset="0"/>
+                <a:cs typeface="Consolas" panose="020B0609020204030204" pitchFamily="49" charset="0"/>
+              </a:rPr>
+              <a:t>morePie</a:t>
+            </a:r>
+            <a:r>
+              <a:rPr lang="en-US" sz="1600" i="1" dirty="0">
+                <a:solidFill>
+                  <a:srgbClr val="9876AA"/>
+                </a:solidFill>
+                <a:effectLst/>
+                <a:latin typeface="Consolas" panose="020B0609020204030204" pitchFamily="49" charset="0"/>
+                <a:cs typeface="Consolas" panose="020B0609020204030204" pitchFamily="49" charset="0"/>
+              </a:rPr>
+              <a:t> </a:t>
+            </a:r>
+            <a:r>
+              <a:rPr lang="en-US" sz="1600" dirty="0">
+                <a:latin typeface="Consolas" panose="020B0609020204030204" pitchFamily="49" charset="0"/>
+                <a:cs typeface="Consolas" panose="020B0609020204030204" pitchFamily="49" charset="0"/>
+              </a:rPr>
+              <a:t>= </a:t>
+            </a:r>
+            <a:r>
+              <a:rPr lang="en-US" sz="1600" dirty="0">
+                <a:solidFill>
+                  <a:srgbClr val="6A8759"/>
+                </a:solidFill>
+                <a:effectLst/>
+                <a:latin typeface="Consolas" panose="020B0609020204030204" pitchFamily="49" charset="0"/>
+                <a:cs typeface="Consolas" panose="020B0609020204030204" pitchFamily="49" charset="0"/>
+              </a:rPr>
+              <a:t>"I need more pie"</a:t>
+            </a:r>
+            <a:r>
+              <a:rPr lang="en-US" sz="1600" dirty="0">
+                <a:solidFill>
+                  <a:srgbClr val="CC7832"/>
+                </a:solidFill>
+                <a:effectLst/>
+                <a:latin typeface="Consolas" panose="020B0609020204030204" pitchFamily="49" charset="0"/>
+                <a:cs typeface="Consolas" panose="020B0609020204030204" pitchFamily="49" charset="0"/>
+              </a:rPr>
+              <a:t>;</a:t>
+            </a:r>
+            <a:br>
+              <a:rPr lang="en-US" sz="1600" dirty="0">
+                <a:solidFill>
+                  <a:srgbClr val="CC7832"/>
+                </a:solidFill>
+                <a:effectLst/>
+                <a:latin typeface="Consolas" panose="020B0609020204030204" pitchFamily="49" charset="0"/>
+                <a:cs typeface="Consolas" panose="020B0609020204030204" pitchFamily="49" charset="0"/>
+              </a:rPr>
+            </a:br>
+            <a:r>
+              <a:rPr lang="en-US" sz="1600" dirty="0">
+                <a:solidFill>
+                  <a:srgbClr val="CC7832"/>
+                </a:solidFill>
+                <a:effectLst/>
+                <a:latin typeface="Consolas" panose="020B0609020204030204" pitchFamily="49" charset="0"/>
+                <a:cs typeface="Consolas" panose="020B0609020204030204" pitchFamily="49" charset="0"/>
+              </a:rPr>
+              <a:t>    </a:t>
+            </a:r>
+            <a:r>
+              <a:rPr lang="en-US" sz="1600" dirty="0">
+                <a:latin typeface="Consolas" panose="020B0609020204030204" pitchFamily="49" charset="0"/>
+                <a:cs typeface="Consolas" panose="020B0609020204030204" pitchFamily="49" charset="0"/>
+              </a:rPr>
+              <a:t>String </a:t>
+            </a:r>
+            <a:r>
+              <a:rPr lang="en-US" sz="1600" i="1" dirty="0" err="1">
+                <a:solidFill>
+                  <a:srgbClr val="9876AA"/>
+                </a:solidFill>
+                <a:effectLst/>
+                <a:latin typeface="Consolas" panose="020B0609020204030204" pitchFamily="49" charset="0"/>
+                <a:cs typeface="Consolas" panose="020B0609020204030204" pitchFamily="49" charset="0"/>
+              </a:rPr>
+              <a:t>actualPie</a:t>
+            </a:r>
+            <a:r>
+              <a:rPr lang="en-US" sz="1600" i="1" dirty="0">
+                <a:solidFill>
+                  <a:srgbClr val="9876AA"/>
+                </a:solidFill>
+                <a:effectLst/>
+                <a:latin typeface="Consolas" panose="020B0609020204030204" pitchFamily="49" charset="0"/>
+                <a:cs typeface="Consolas" panose="020B0609020204030204" pitchFamily="49" charset="0"/>
+              </a:rPr>
+              <a:t> </a:t>
+            </a:r>
+            <a:r>
+              <a:rPr lang="en-US" sz="1600" dirty="0">
+                <a:latin typeface="Consolas" panose="020B0609020204030204" pitchFamily="49" charset="0"/>
+                <a:cs typeface="Consolas" panose="020B0609020204030204" pitchFamily="49" charset="0"/>
+              </a:rPr>
+              <a:t>= </a:t>
+            </a:r>
+            <a:r>
+              <a:rPr lang="en-US" sz="1600" dirty="0">
+                <a:solidFill>
+                  <a:srgbClr val="6A8759"/>
+                </a:solidFill>
+                <a:effectLst/>
+                <a:latin typeface="Consolas" panose="020B0609020204030204" pitchFamily="49" charset="0"/>
+                <a:cs typeface="Consolas" panose="020B0609020204030204" pitchFamily="49" charset="0"/>
+              </a:rPr>
+              <a:t>"</a:t>
+            </a:r>
+            <a:r>
+              <a:rPr lang="el-GR" sz="1600" dirty="0">
+                <a:solidFill>
+                  <a:srgbClr val="6A8759"/>
+                </a:solidFill>
+                <a:effectLst/>
+                <a:latin typeface="Consolas" panose="020B0609020204030204" pitchFamily="49" charset="0"/>
+                <a:cs typeface="Consolas" panose="020B0609020204030204" pitchFamily="49" charset="0"/>
+              </a:rPr>
+              <a:t>π"</a:t>
+            </a:r>
+            <a:r>
+              <a:rPr lang="el-GR" sz="1600" dirty="0">
+                <a:solidFill>
+                  <a:srgbClr val="CC7832"/>
+                </a:solidFill>
+                <a:effectLst/>
+                <a:latin typeface="Consolas" panose="020B0609020204030204" pitchFamily="49" charset="0"/>
+                <a:cs typeface="Consolas" panose="020B0609020204030204" pitchFamily="49" charset="0"/>
+              </a:rPr>
+              <a:t>;</a:t>
+            </a:r>
+            <a:br>
+              <a:rPr lang="el-GR" sz="1600" dirty="0">
+                <a:solidFill>
+                  <a:srgbClr val="CC7832"/>
+                </a:solidFill>
+                <a:effectLst/>
+                <a:latin typeface="Consolas" panose="020B0609020204030204" pitchFamily="49" charset="0"/>
+                <a:cs typeface="Consolas" panose="020B0609020204030204" pitchFamily="49" charset="0"/>
+              </a:rPr>
+            </a:br>
+            <a:br>
+              <a:rPr lang="el-GR" sz="1600" dirty="0">
+                <a:solidFill>
+                  <a:srgbClr val="CC7832"/>
+                </a:solidFill>
+                <a:effectLst/>
+                <a:latin typeface="Consolas" panose="020B0609020204030204" pitchFamily="49" charset="0"/>
+                <a:cs typeface="Consolas" panose="020B0609020204030204" pitchFamily="49" charset="0"/>
+              </a:rPr>
+            </a:br>
+            <a:r>
+              <a:rPr lang="el-GR" sz="1600" dirty="0">
+                <a:solidFill>
+                  <a:srgbClr val="CC7832"/>
+                </a:solidFill>
+                <a:effectLst/>
+                <a:latin typeface="Consolas" panose="020B0609020204030204" pitchFamily="49" charset="0"/>
+                <a:cs typeface="Consolas" panose="020B0609020204030204" pitchFamily="49" charset="0"/>
+              </a:rPr>
+              <a:t>    </a:t>
+            </a:r>
+            <a:r>
+              <a:rPr lang="en-US" sz="1600" dirty="0">
+                <a:solidFill>
+                  <a:srgbClr val="CC7832"/>
+                </a:solidFill>
+                <a:effectLst/>
+                <a:latin typeface="Consolas" panose="020B0609020204030204" pitchFamily="49" charset="0"/>
+                <a:cs typeface="Consolas" panose="020B0609020204030204" pitchFamily="49" charset="0"/>
+              </a:rPr>
+              <a:t>if </a:t>
+            </a:r>
+            <a:r>
+              <a:rPr lang="en-US" sz="1600" dirty="0">
+                <a:latin typeface="Consolas" panose="020B0609020204030204" pitchFamily="49" charset="0"/>
+                <a:cs typeface="Consolas" panose="020B0609020204030204" pitchFamily="49" charset="0"/>
+              </a:rPr>
+              <a:t>(</a:t>
+            </a:r>
+            <a:r>
+              <a:rPr lang="en-US" sz="1600" i="1" dirty="0" err="1">
+                <a:solidFill>
+                  <a:srgbClr val="9876AA"/>
+                </a:solidFill>
+                <a:effectLst/>
+                <a:latin typeface="Consolas" panose="020B0609020204030204" pitchFamily="49" charset="0"/>
+                <a:cs typeface="Consolas" panose="020B0609020204030204" pitchFamily="49" charset="0"/>
+              </a:rPr>
+              <a:t>valOne</a:t>
+            </a:r>
+            <a:r>
+              <a:rPr lang="en-US" sz="1600" i="1" dirty="0">
+                <a:solidFill>
+                  <a:srgbClr val="9876AA"/>
+                </a:solidFill>
+                <a:effectLst/>
+                <a:latin typeface="Consolas" panose="020B0609020204030204" pitchFamily="49" charset="0"/>
+                <a:cs typeface="Consolas" panose="020B0609020204030204" pitchFamily="49" charset="0"/>
+              </a:rPr>
+              <a:t> </a:t>
+            </a:r>
+            <a:r>
+              <a:rPr lang="en-US" sz="1600" dirty="0">
+                <a:latin typeface="Consolas" panose="020B0609020204030204" pitchFamily="49" charset="0"/>
+                <a:cs typeface="Consolas" panose="020B0609020204030204" pitchFamily="49" charset="0"/>
+              </a:rPr>
+              <a:t>&gt; </a:t>
+            </a:r>
+            <a:r>
+              <a:rPr lang="en-US" sz="1600" i="1" dirty="0" err="1">
+                <a:solidFill>
+                  <a:srgbClr val="9876AA"/>
+                </a:solidFill>
+                <a:effectLst/>
+                <a:latin typeface="Consolas" panose="020B0609020204030204" pitchFamily="49" charset="0"/>
+                <a:cs typeface="Consolas" panose="020B0609020204030204" pitchFamily="49" charset="0"/>
+              </a:rPr>
+              <a:t>valTwo</a:t>
+            </a:r>
+            <a:r>
+              <a:rPr lang="en-US" sz="1600" dirty="0">
+                <a:latin typeface="Consolas" panose="020B0609020204030204" pitchFamily="49" charset="0"/>
+                <a:cs typeface="Consolas" panose="020B0609020204030204" pitchFamily="49" charset="0"/>
+              </a:rPr>
+              <a:t>) {</a:t>
+            </a:r>
+            <a:br>
+              <a:rPr lang="en-US" sz="1600" dirty="0">
+                <a:latin typeface="Consolas" panose="020B0609020204030204" pitchFamily="49" charset="0"/>
+                <a:cs typeface="Consolas" panose="020B0609020204030204" pitchFamily="49" charset="0"/>
+              </a:rPr>
+            </a:br>
+            <a:r>
+              <a:rPr lang="en-US" sz="1600" dirty="0">
+                <a:latin typeface="Consolas" panose="020B0609020204030204" pitchFamily="49" charset="0"/>
+                <a:cs typeface="Consolas" panose="020B0609020204030204" pitchFamily="49" charset="0"/>
+              </a:rPr>
+              <a:t>        </a:t>
+            </a:r>
+            <a:r>
+              <a:rPr lang="en-US" sz="1600" dirty="0">
+                <a:solidFill>
+                  <a:srgbClr val="CC7832"/>
+                </a:solidFill>
+                <a:effectLst/>
+                <a:latin typeface="Consolas" panose="020B0609020204030204" pitchFamily="49" charset="0"/>
+                <a:cs typeface="Consolas" panose="020B0609020204030204" pitchFamily="49" charset="0"/>
+              </a:rPr>
+              <a:t>if </a:t>
+            </a:r>
+            <a:r>
+              <a:rPr lang="en-US" sz="1600" dirty="0">
+                <a:latin typeface="Consolas" panose="020B0609020204030204" pitchFamily="49" charset="0"/>
+                <a:cs typeface="Consolas" panose="020B0609020204030204" pitchFamily="49" charset="0"/>
+              </a:rPr>
+              <a:t>(</a:t>
+            </a:r>
+            <a:r>
+              <a:rPr lang="en-US" sz="1600" i="1" dirty="0" err="1">
+                <a:solidFill>
+                  <a:srgbClr val="9876AA"/>
+                </a:solidFill>
+                <a:effectLst/>
+                <a:latin typeface="Consolas" panose="020B0609020204030204" pitchFamily="49" charset="0"/>
+                <a:cs typeface="Consolas" panose="020B0609020204030204" pitchFamily="49" charset="0"/>
+              </a:rPr>
+              <a:t>valOne</a:t>
+            </a:r>
+            <a:r>
+              <a:rPr lang="en-US" sz="1600" i="1" dirty="0">
+                <a:solidFill>
+                  <a:srgbClr val="9876AA"/>
+                </a:solidFill>
+                <a:effectLst/>
+                <a:latin typeface="Consolas" panose="020B0609020204030204" pitchFamily="49" charset="0"/>
+                <a:cs typeface="Consolas" panose="020B0609020204030204" pitchFamily="49" charset="0"/>
+              </a:rPr>
+              <a:t> </a:t>
+            </a:r>
+            <a:r>
+              <a:rPr lang="en-US" sz="1600" dirty="0">
+                <a:latin typeface="Consolas" panose="020B0609020204030204" pitchFamily="49" charset="0"/>
+                <a:cs typeface="Consolas" panose="020B0609020204030204" pitchFamily="49" charset="0"/>
+              </a:rPr>
+              <a:t>&gt; </a:t>
+            </a:r>
+            <a:r>
+              <a:rPr lang="en-US" sz="1600" i="1" dirty="0">
+                <a:solidFill>
+                  <a:srgbClr val="9876AA"/>
+                </a:solidFill>
+                <a:effectLst/>
+                <a:latin typeface="Consolas" panose="020B0609020204030204" pitchFamily="49" charset="0"/>
+                <a:cs typeface="Consolas" panose="020B0609020204030204" pitchFamily="49" charset="0"/>
+              </a:rPr>
+              <a:t>pi</a:t>
+            </a:r>
+            <a:r>
+              <a:rPr lang="en-US" sz="1600" dirty="0">
+                <a:latin typeface="Consolas" panose="020B0609020204030204" pitchFamily="49" charset="0"/>
+                <a:cs typeface="Consolas" panose="020B0609020204030204" pitchFamily="49" charset="0"/>
+              </a:rPr>
+              <a:t>) {</a:t>
+            </a:r>
+            <a:br>
+              <a:rPr lang="en-US" sz="1600" dirty="0">
+                <a:latin typeface="Consolas" panose="020B0609020204030204" pitchFamily="49" charset="0"/>
+                <a:cs typeface="Consolas" panose="020B0609020204030204" pitchFamily="49" charset="0"/>
+              </a:rPr>
+            </a:br>
+            <a:r>
+              <a:rPr lang="en-US" sz="1600" dirty="0">
+                <a:latin typeface="Consolas" panose="020B0609020204030204" pitchFamily="49" charset="0"/>
+                <a:cs typeface="Consolas" panose="020B0609020204030204" pitchFamily="49" charset="0"/>
+              </a:rPr>
+              <a:t>            </a:t>
+            </a:r>
+            <a:r>
+              <a:rPr lang="en-US" sz="1600" dirty="0">
+                <a:solidFill>
+                  <a:srgbClr val="CC7832"/>
+                </a:solidFill>
+                <a:effectLst/>
+                <a:latin typeface="Consolas" panose="020B0609020204030204" pitchFamily="49" charset="0"/>
+                <a:cs typeface="Consolas" panose="020B0609020204030204" pitchFamily="49" charset="0"/>
+              </a:rPr>
+              <a:t>return </a:t>
+            </a:r>
+            <a:r>
+              <a:rPr lang="en-US" sz="1600" i="1" dirty="0" err="1">
+                <a:solidFill>
+                  <a:srgbClr val="9876AA"/>
+                </a:solidFill>
+                <a:effectLst/>
+                <a:latin typeface="Consolas" panose="020B0609020204030204" pitchFamily="49" charset="0"/>
+                <a:cs typeface="Consolas" panose="020B0609020204030204" pitchFamily="49" charset="0"/>
+              </a:rPr>
+              <a:t>hasPie</a:t>
+            </a:r>
+            <a:r>
+              <a:rPr lang="en-US" sz="1600" dirty="0">
+                <a:solidFill>
+                  <a:srgbClr val="CC7832"/>
+                </a:solidFill>
+                <a:effectLst/>
+                <a:latin typeface="Consolas" panose="020B0609020204030204" pitchFamily="49" charset="0"/>
+                <a:cs typeface="Consolas" panose="020B0609020204030204" pitchFamily="49" charset="0"/>
+              </a:rPr>
+              <a:t>;</a:t>
+            </a:r>
+            <a:br>
+              <a:rPr lang="en-US" sz="1600" dirty="0">
+                <a:solidFill>
+                  <a:srgbClr val="CC7832"/>
+                </a:solidFill>
+                <a:effectLst/>
+                <a:latin typeface="Consolas" panose="020B0609020204030204" pitchFamily="49" charset="0"/>
+                <a:cs typeface="Consolas" panose="020B0609020204030204" pitchFamily="49" charset="0"/>
+              </a:rPr>
+            </a:br>
+            <a:r>
+              <a:rPr lang="en-US" sz="1600" dirty="0">
+                <a:solidFill>
+                  <a:srgbClr val="CC7832"/>
+                </a:solidFill>
+                <a:effectLst/>
+                <a:latin typeface="Consolas" panose="020B0609020204030204" pitchFamily="49" charset="0"/>
+                <a:cs typeface="Consolas" panose="020B0609020204030204" pitchFamily="49" charset="0"/>
+              </a:rPr>
+              <a:t>        </a:t>
+            </a:r>
+            <a:r>
+              <a:rPr lang="en-US" sz="1600" dirty="0">
+                <a:latin typeface="Consolas" panose="020B0609020204030204" pitchFamily="49" charset="0"/>
+                <a:cs typeface="Consolas" panose="020B0609020204030204" pitchFamily="49" charset="0"/>
+              </a:rPr>
+              <a:t>}</a:t>
+            </a:r>
+            <a:br>
+              <a:rPr lang="en-US" sz="1600" dirty="0">
+                <a:latin typeface="Consolas" panose="020B0609020204030204" pitchFamily="49" charset="0"/>
+                <a:cs typeface="Consolas" panose="020B0609020204030204" pitchFamily="49" charset="0"/>
+              </a:rPr>
+            </a:br>
+            <a:r>
+              <a:rPr lang="en-US" sz="1600" dirty="0">
+                <a:latin typeface="Consolas" panose="020B0609020204030204" pitchFamily="49" charset="0"/>
+                <a:cs typeface="Consolas" panose="020B0609020204030204" pitchFamily="49" charset="0"/>
+              </a:rPr>
+              <a:t>    } </a:t>
+            </a:r>
+            <a:r>
+              <a:rPr lang="en-US" sz="1600" dirty="0">
+                <a:solidFill>
+                  <a:srgbClr val="CC7832"/>
+                </a:solidFill>
+                <a:effectLst/>
+                <a:latin typeface="Consolas" panose="020B0609020204030204" pitchFamily="49" charset="0"/>
+                <a:cs typeface="Consolas" panose="020B0609020204030204" pitchFamily="49" charset="0"/>
+              </a:rPr>
+              <a:t>else if </a:t>
+            </a:r>
+            <a:r>
+              <a:rPr lang="en-US" sz="1600" dirty="0">
+                <a:latin typeface="Consolas" panose="020B0609020204030204" pitchFamily="49" charset="0"/>
+                <a:cs typeface="Consolas" panose="020B0609020204030204" pitchFamily="49" charset="0"/>
+              </a:rPr>
+              <a:t>(</a:t>
+            </a:r>
+            <a:r>
+              <a:rPr lang="en-US" sz="1600" i="1" dirty="0" err="1">
+                <a:solidFill>
+                  <a:srgbClr val="9876AA"/>
+                </a:solidFill>
+                <a:effectLst/>
+                <a:latin typeface="Consolas" panose="020B0609020204030204" pitchFamily="49" charset="0"/>
+                <a:cs typeface="Consolas" panose="020B0609020204030204" pitchFamily="49" charset="0"/>
+              </a:rPr>
+              <a:t>valTwo</a:t>
+            </a:r>
+            <a:r>
+              <a:rPr lang="en-US" sz="1600" i="1" dirty="0">
+                <a:solidFill>
+                  <a:srgbClr val="9876AA"/>
+                </a:solidFill>
+                <a:effectLst/>
+                <a:latin typeface="Consolas" panose="020B0609020204030204" pitchFamily="49" charset="0"/>
+                <a:cs typeface="Consolas" panose="020B0609020204030204" pitchFamily="49" charset="0"/>
+              </a:rPr>
+              <a:t> </a:t>
+            </a:r>
+            <a:r>
+              <a:rPr lang="en-US" sz="1600" dirty="0">
+                <a:latin typeface="Consolas" panose="020B0609020204030204" pitchFamily="49" charset="0"/>
+                <a:cs typeface="Consolas" panose="020B0609020204030204" pitchFamily="49" charset="0"/>
+              </a:rPr>
+              <a:t>&gt;= </a:t>
+            </a:r>
+            <a:r>
+              <a:rPr lang="en-US" sz="1600" i="1" dirty="0" err="1">
+                <a:solidFill>
+                  <a:srgbClr val="9876AA"/>
+                </a:solidFill>
+                <a:effectLst/>
+                <a:latin typeface="Consolas" panose="020B0609020204030204" pitchFamily="49" charset="0"/>
+                <a:cs typeface="Consolas" panose="020B0609020204030204" pitchFamily="49" charset="0"/>
+              </a:rPr>
+              <a:t>valThree</a:t>
+            </a:r>
+            <a:r>
+              <a:rPr lang="en-US" sz="1600" dirty="0">
+                <a:latin typeface="Consolas" panose="020B0609020204030204" pitchFamily="49" charset="0"/>
+                <a:cs typeface="Consolas" panose="020B0609020204030204" pitchFamily="49" charset="0"/>
+              </a:rPr>
+              <a:t>) {</a:t>
+            </a:r>
+            <a:br>
+              <a:rPr lang="en-US" sz="1600" dirty="0">
+                <a:latin typeface="Consolas" panose="020B0609020204030204" pitchFamily="49" charset="0"/>
+                <a:cs typeface="Consolas" panose="020B0609020204030204" pitchFamily="49" charset="0"/>
+              </a:rPr>
+            </a:br>
+            <a:r>
+              <a:rPr lang="en-US" sz="1600" dirty="0">
+                <a:latin typeface="Consolas" panose="020B0609020204030204" pitchFamily="49" charset="0"/>
+                <a:cs typeface="Consolas" panose="020B0609020204030204" pitchFamily="49" charset="0"/>
+              </a:rPr>
+              <a:t>        </a:t>
+            </a:r>
+            <a:r>
+              <a:rPr lang="en-US" sz="1600" dirty="0">
+                <a:solidFill>
+                  <a:srgbClr val="CC7832"/>
+                </a:solidFill>
+                <a:effectLst/>
+                <a:latin typeface="Consolas" panose="020B0609020204030204" pitchFamily="49" charset="0"/>
+                <a:cs typeface="Consolas" panose="020B0609020204030204" pitchFamily="49" charset="0"/>
+              </a:rPr>
+              <a:t>return </a:t>
+            </a:r>
+            <a:r>
+              <a:rPr lang="en-US" sz="1600" i="1" dirty="0" err="1">
+                <a:solidFill>
+                  <a:srgbClr val="9876AA"/>
+                </a:solidFill>
+                <a:effectLst/>
+                <a:latin typeface="Consolas" panose="020B0609020204030204" pitchFamily="49" charset="0"/>
+                <a:cs typeface="Consolas" panose="020B0609020204030204" pitchFamily="49" charset="0"/>
+              </a:rPr>
+              <a:t>morePie</a:t>
+            </a:r>
+            <a:r>
+              <a:rPr lang="en-US" sz="1600" dirty="0">
+                <a:solidFill>
+                  <a:srgbClr val="CC7832"/>
+                </a:solidFill>
+                <a:effectLst/>
+                <a:latin typeface="Consolas" panose="020B0609020204030204" pitchFamily="49" charset="0"/>
+                <a:cs typeface="Consolas" panose="020B0609020204030204" pitchFamily="49" charset="0"/>
+              </a:rPr>
+              <a:t>;</a:t>
+            </a:r>
+            <a:br>
+              <a:rPr lang="en-US" sz="1600" dirty="0">
+                <a:solidFill>
+                  <a:srgbClr val="CC7832"/>
+                </a:solidFill>
+                <a:effectLst/>
+                <a:latin typeface="Consolas" panose="020B0609020204030204" pitchFamily="49" charset="0"/>
+                <a:cs typeface="Consolas" panose="020B0609020204030204" pitchFamily="49" charset="0"/>
+              </a:rPr>
+            </a:br>
+            <a:r>
+              <a:rPr lang="en-US" sz="1600" dirty="0">
+                <a:solidFill>
+                  <a:srgbClr val="CC7832"/>
+                </a:solidFill>
+                <a:effectLst/>
+                <a:latin typeface="Consolas" panose="020B0609020204030204" pitchFamily="49" charset="0"/>
+                <a:cs typeface="Consolas" panose="020B0609020204030204" pitchFamily="49" charset="0"/>
+              </a:rPr>
+              <a:t>    </a:t>
+            </a:r>
+            <a:r>
+              <a:rPr lang="en-US" sz="1600" dirty="0">
+                <a:latin typeface="Consolas" panose="020B0609020204030204" pitchFamily="49" charset="0"/>
+                <a:cs typeface="Consolas" panose="020B0609020204030204" pitchFamily="49" charset="0"/>
+              </a:rPr>
+              <a:t>} </a:t>
+            </a:r>
+            <a:r>
+              <a:rPr lang="en-US" sz="1600" dirty="0">
+                <a:solidFill>
+                  <a:srgbClr val="CC7832"/>
+                </a:solidFill>
+                <a:effectLst/>
+                <a:latin typeface="Consolas" panose="020B0609020204030204" pitchFamily="49" charset="0"/>
+                <a:cs typeface="Consolas" panose="020B0609020204030204" pitchFamily="49" charset="0"/>
+              </a:rPr>
+              <a:t>else </a:t>
+            </a:r>
+            <a:r>
+              <a:rPr lang="en-US" sz="1600" dirty="0">
+                <a:latin typeface="Consolas" panose="020B0609020204030204" pitchFamily="49" charset="0"/>
+                <a:cs typeface="Consolas" panose="020B0609020204030204" pitchFamily="49" charset="0"/>
+              </a:rPr>
+              <a:t>{</a:t>
+            </a:r>
+            <a:br>
+              <a:rPr lang="en-US" sz="1600" dirty="0">
+                <a:latin typeface="Consolas" panose="020B0609020204030204" pitchFamily="49" charset="0"/>
+                <a:cs typeface="Consolas" panose="020B0609020204030204" pitchFamily="49" charset="0"/>
+              </a:rPr>
+            </a:br>
+            <a:r>
+              <a:rPr lang="en-US" sz="1600" dirty="0">
+                <a:latin typeface="Consolas" panose="020B0609020204030204" pitchFamily="49" charset="0"/>
+                <a:cs typeface="Consolas" panose="020B0609020204030204" pitchFamily="49" charset="0"/>
+              </a:rPr>
+              <a:t>        </a:t>
+            </a:r>
+            <a:r>
+              <a:rPr lang="en-US" sz="1600" dirty="0">
+                <a:solidFill>
+                  <a:srgbClr val="CC7832"/>
+                </a:solidFill>
+                <a:effectLst/>
+                <a:latin typeface="Consolas" panose="020B0609020204030204" pitchFamily="49" charset="0"/>
+                <a:cs typeface="Consolas" panose="020B0609020204030204" pitchFamily="49" charset="0"/>
+              </a:rPr>
+              <a:t>if </a:t>
+            </a:r>
+            <a:r>
+              <a:rPr lang="en-US" sz="1600" dirty="0">
+                <a:latin typeface="Consolas" panose="020B0609020204030204" pitchFamily="49" charset="0"/>
+                <a:cs typeface="Consolas" panose="020B0609020204030204" pitchFamily="49" charset="0"/>
+              </a:rPr>
+              <a:t>(</a:t>
+            </a:r>
+            <a:r>
+              <a:rPr lang="en-US" sz="1600" i="1" dirty="0" err="1">
+                <a:solidFill>
+                  <a:srgbClr val="9876AA"/>
+                </a:solidFill>
+                <a:effectLst/>
+                <a:latin typeface="Consolas" panose="020B0609020204030204" pitchFamily="49" charset="0"/>
+                <a:cs typeface="Consolas" panose="020B0609020204030204" pitchFamily="49" charset="0"/>
+              </a:rPr>
+              <a:t>valThree</a:t>
+            </a:r>
+            <a:r>
+              <a:rPr lang="en-US" sz="1600" i="1" dirty="0">
+                <a:solidFill>
+                  <a:srgbClr val="9876AA"/>
+                </a:solidFill>
+                <a:effectLst/>
+                <a:latin typeface="Consolas" panose="020B0609020204030204" pitchFamily="49" charset="0"/>
+                <a:cs typeface="Consolas" panose="020B0609020204030204" pitchFamily="49" charset="0"/>
+              </a:rPr>
+              <a:t> </a:t>
+            </a:r>
+            <a:r>
+              <a:rPr lang="en-US" sz="1600" dirty="0">
+                <a:latin typeface="Consolas" panose="020B0609020204030204" pitchFamily="49" charset="0"/>
+                <a:cs typeface="Consolas" panose="020B0609020204030204" pitchFamily="49" charset="0"/>
+              </a:rPr>
+              <a:t>&lt; </a:t>
+            </a:r>
+            <a:r>
+              <a:rPr lang="en-US" sz="1600" dirty="0">
+                <a:solidFill>
+                  <a:srgbClr val="6897BB"/>
+                </a:solidFill>
+                <a:effectLst/>
+                <a:latin typeface="Consolas" panose="020B0609020204030204" pitchFamily="49" charset="0"/>
+                <a:cs typeface="Consolas" panose="020B0609020204030204" pitchFamily="49" charset="0"/>
+              </a:rPr>
+              <a:t>3.14</a:t>
+            </a:r>
+            <a:r>
+              <a:rPr lang="en-US" sz="1600" dirty="0">
+                <a:latin typeface="Consolas" panose="020B0609020204030204" pitchFamily="49" charset="0"/>
+                <a:cs typeface="Consolas" panose="020B0609020204030204" pitchFamily="49" charset="0"/>
+              </a:rPr>
+              <a:t>) {</a:t>
+            </a:r>
+            <a:br>
+              <a:rPr lang="en-US" sz="1600" dirty="0">
+                <a:latin typeface="Consolas" panose="020B0609020204030204" pitchFamily="49" charset="0"/>
+                <a:cs typeface="Consolas" panose="020B0609020204030204" pitchFamily="49" charset="0"/>
+              </a:rPr>
+            </a:br>
+            <a:r>
+              <a:rPr lang="en-US" sz="1600" dirty="0">
+                <a:latin typeface="Consolas" panose="020B0609020204030204" pitchFamily="49" charset="0"/>
+                <a:cs typeface="Consolas" panose="020B0609020204030204" pitchFamily="49" charset="0"/>
+              </a:rPr>
+              <a:t>            </a:t>
+            </a:r>
+            <a:r>
+              <a:rPr lang="en-US" sz="1600" dirty="0">
+                <a:solidFill>
+                  <a:srgbClr val="CC7832"/>
+                </a:solidFill>
+                <a:effectLst/>
+                <a:latin typeface="Consolas" panose="020B0609020204030204" pitchFamily="49" charset="0"/>
+                <a:cs typeface="Consolas" panose="020B0609020204030204" pitchFamily="49" charset="0"/>
+              </a:rPr>
+              <a:t>return </a:t>
+            </a:r>
+            <a:r>
+              <a:rPr lang="en-US" sz="1600" i="1" dirty="0" err="1">
+                <a:solidFill>
+                  <a:srgbClr val="9876AA"/>
+                </a:solidFill>
+                <a:effectLst/>
+                <a:latin typeface="Consolas" panose="020B0609020204030204" pitchFamily="49" charset="0"/>
+                <a:cs typeface="Consolas" panose="020B0609020204030204" pitchFamily="49" charset="0"/>
+              </a:rPr>
+              <a:t>actualPie</a:t>
+            </a:r>
+            <a:r>
+              <a:rPr lang="en-US" sz="1600" dirty="0">
+                <a:solidFill>
+                  <a:srgbClr val="CC7832"/>
+                </a:solidFill>
+                <a:effectLst/>
+                <a:latin typeface="Consolas" panose="020B0609020204030204" pitchFamily="49" charset="0"/>
+                <a:cs typeface="Consolas" panose="020B0609020204030204" pitchFamily="49" charset="0"/>
+              </a:rPr>
+              <a:t>;</a:t>
+            </a:r>
+            <a:br>
+              <a:rPr lang="en-US" sz="1600" dirty="0">
+                <a:solidFill>
+                  <a:srgbClr val="CC7832"/>
+                </a:solidFill>
+                <a:effectLst/>
+                <a:latin typeface="Consolas" panose="020B0609020204030204" pitchFamily="49" charset="0"/>
+                <a:cs typeface="Consolas" panose="020B0609020204030204" pitchFamily="49" charset="0"/>
+              </a:rPr>
+            </a:br>
+            <a:r>
+              <a:rPr lang="en-US" sz="1600" dirty="0">
+                <a:solidFill>
+                  <a:srgbClr val="CC7832"/>
+                </a:solidFill>
+                <a:effectLst/>
+                <a:latin typeface="Consolas" panose="020B0609020204030204" pitchFamily="49" charset="0"/>
+                <a:cs typeface="Consolas" panose="020B0609020204030204" pitchFamily="49" charset="0"/>
+              </a:rPr>
+              <a:t>        </a:t>
+            </a:r>
+            <a:r>
+              <a:rPr lang="en-US" sz="1600" dirty="0">
+                <a:latin typeface="Consolas" panose="020B0609020204030204" pitchFamily="49" charset="0"/>
+                <a:cs typeface="Consolas" panose="020B0609020204030204" pitchFamily="49" charset="0"/>
+              </a:rPr>
+              <a:t>}</a:t>
+            </a:r>
+            <a:br>
+              <a:rPr lang="en-US" sz="1600" dirty="0">
+                <a:latin typeface="Consolas" panose="020B0609020204030204" pitchFamily="49" charset="0"/>
+                <a:cs typeface="Consolas" panose="020B0609020204030204" pitchFamily="49" charset="0"/>
+              </a:rPr>
+            </a:br>
+            <a:r>
+              <a:rPr lang="en-US" sz="1600" dirty="0">
+                <a:latin typeface="Consolas" panose="020B0609020204030204" pitchFamily="49" charset="0"/>
+                <a:cs typeface="Consolas" panose="020B0609020204030204" pitchFamily="49" charset="0"/>
+              </a:rPr>
+              <a:t>        </a:t>
+            </a:r>
+            <a:r>
+              <a:rPr lang="en-US" sz="1600" dirty="0">
+                <a:solidFill>
+                  <a:srgbClr val="CC7832"/>
+                </a:solidFill>
+                <a:effectLst/>
+                <a:latin typeface="Consolas" panose="020B0609020204030204" pitchFamily="49" charset="0"/>
+                <a:cs typeface="Consolas" panose="020B0609020204030204" pitchFamily="49" charset="0"/>
+              </a:rPr>
+              <a:t>return </a:t>
+            </a:r>
+            <a:r>
+              <a:rPr lang="en-US" sz="1600" dirty="0">
+                <a:solidFill>
+                  <a:srgbClr val="6A8759"/>
+                </a:solidFill>
+                <a:effectLst/>
+                <a:latin typeface="Consolas" panose="020B0609020204030204" pitchFamily="49" charset="0"/>
+                <a:cs typeface="Consolas" panose="020B0609020204030204" pitchFamily="49" charset="0"/>
+              </a:rPr>
+              <a:t>"The value of pi is: " </a:t>
+            </a:r>
+            <a:r>
+              <a:rPr lang="en-US" sz="1600" dirty="0">
+                <a:latin typeface="Consolas" panose="020B0609020204030204" pitchFamily="49" charset="0"/>
+                <a:cs typeface="Consolas" panose="020B0609020204030204" pitchFamily="49" charset="0"/>
+              </a:rPr>
+              <a:t>+ </a:t>
+            </a:r>
+            <a:r>
+              <a:rPr lang="en-US" sz="1600" i="1" dirty="0">
+                <a:solidFill>
+                  <a:srgbClr val="9876AA"/>
+                </a:solidFill>
+                <a:effectLst/>
+                <a:latin typeface="Consolas" panose="020B0609020204030204" pitchFamily="49" charset="0"/>
+                <a:cs typeface="Consolas" panose="020B0609020204030204" pitchFamily="49" charset="0"/>
+              </a:rPr>
+              <a:t>pi</a:t>
+            </a:r>
+            <a:r>
+              <a:rPr lang="en-US" sz="1600" dirty="0">
+                <a:solidFill>
+                  <a:srgbClr val="CC7832"/>
+                </a:solidFill>
+                <a:effectLst/>
+                <a:latin typeface="Consolas" panose="020B0609020204030204" pitchFamily="49" charset="0"/>
+                <a:cs typeface="Consolas" panose="020B0609020204030204" pitchFamily="49" charset="0"/>
+              </a:rPr>
+              <a:t>;</a:t>
+            </a:r>
+            <a:br>
+              <a:rPr lang="en-US" sz="1600" dirty="0">
+                <a:solidFill>
+                  <a:srgbClr val="CC7832"/>
+                </a:solidFill>
+                <a:effectLst/>
+                <a:latin typeface="Consolas" panose="020B0609020204030204" pitchFamily="49" charset="0"/>
+                <a:cs typeface="Consolas" panose="020B0609020204030204" pitchFamily="49" charset="0"/>
+              </a:rPr>
+            </a:br>
+            <a:r>
+              <a:rPr lang="en-US" sz="1600" dirty="0">
+                <a:solidFill>
+                  <a:srgbClr val="CC7832"/>
+                </a:solidFill>
+                <a:effectLst/>
+                <a:latin typeface="Consolas" panose="020B0609020204030204" pitchFamily="49" charset="0"/>
+                <a:cs typeface="Consolas" panose="020B0609020204030204" pitchFamily="49" charset="0"/>
+              </a:rPr>
+              <a:t>    </a:t>
+            </a:r>
+            <a:r>
+              <a:rPr lang="en-US" sz="1600" dirty="0">
+                <a:latin typeface="Consolas" panose="020B0609020204030204" pitchFamily="49" charset="0"/>
+                <a:cs typeface="Consolas" panose="020B0609020204030204" pitchFamily="49" charset="0"/>
+              </a:rPr>
+              <a:t>}</a:t>
+            </a:r>
+            <a:br>
+              <a:rPr lang="en-US" sz="1600" dirty="0">
+                <a:latin typeface="Consolas" panose="020B0609020204030204" pitchFamily="49" charset="0"/>
+                <a:cs typeface="Consolas" panose="020B0609020204030204" pitchFamily="49" charset="0"/>
+              </a:rPr>
+            </a:br>
+            <a:r>
+              <a:rPr lang="en-US" sz="1600" dirty="0">
+                <a:latin typeface="Consolas" panose="020B0609020204030204" pitchFamily="49" charset="0"/>
+                <a:cs typeface="Consolas" panose="020B0609020204030204" pitchFamily="49" charset="0"/>
+              </a:rPr>
+              <a:t>    </a:t>
+            </a:r>
+            <a:r>
+              <a:rPr lang="en-US" sz="1600" dirty="0">
+                <a:solidFill>
+                  <a:srgbClr val="CC7832"/>
+                </a:solidFill>
+                <a:effectLst/>
+                <a:latin typeface="Consolas" panose="020B0609020204030204" pitchFamily="49" charset="0"/>
+                <a:cs typeface="Consolas" panose="020B0609020204030204" pitchFamily="49" charset="0"/>
+              </a:rPr>
+              <a:t>return </a:t>
+            </a:r>
+            <a:r>
+              <a:rPr lang="en-US" sz="1600" dirty="0">
+                <a:solidFill>
+                  <a:srgbClr val="6A8759"/>
+                </a:solidFill>
+                <a:effectLst/>
+                <a:latin typeface="Consolas" panose="020B0609020204030204" pitchFamily="49" charset="0"/>
+                <a:cs typeface="Consolas" panose="020B0609020204030204" pitchFamily="49" charset="0"/>
+              </a:rPr>
+              <a:t>"no pie"</a:t>
+            </a:r>
+            <a:r>
+              <a:rPr lang="en-US" sz="1600" dirty="0">
+                <a:solidFill>
+                  <a:srgbClr val="CC7832"/>
+                </a:solidFill>
+                <a:effectLst/>
+                <a:latin typeface="Consolas" panose="020B0609020204030204" pitchFamily="49" charset="0"/>
+                <a:cs typeface="Consolas" panose="020B0609020204030204" pitchFamily="49" charset="0"/>
+              </a:rPr>
+              <a:t>;</a:t>
+            </a:r>
+            <a:br>
+              <a:rPr lang="en-US" sz="1600" dirty="0">
+                <a:solidFill>
+                  <a:srgbClr val="CC7832"/>
+                </a:solidFill>
+                <a:effectLst/>
+                <a:latin typeface="Consolas" panose="020B0609020204030204" pitchFamily="49" charset="0"/>
+                <a:cs typeface="Consolas" panose="020B0609020204030204" pitchFamily="49" charset="0"/>
+              </a:rPr>
+            </a:br>
+            <a:r>
+              <a:rPr lang="en-US" sz="1600" dirty="0">
+                <a:latin typeface="Consolas" panose="020B0609020204030204" pitchFamily="49" charset="0"/>
+                <a:cs typeface="Consolas" panose="020B0609020204030204" pitchFamily="49" charset="0"/>
+              </a:rPr>
+              <a:t>}</a:t>
+            </a:r>
           </a:p>
         </p:txBody>
       </p:sp>
     </p:spTree>
     <p:extLst>
       <p:ext uri="{BB962C8B-B14F-4D97-AF65-F5344CB8AC3E}">
-        <p14:creationId xmlns:p14="http://schemas.microsoft.com/office/powerpoint/2010/main" val="3877744934"/>
+        <p14:creationId xmlns:p14="http://schemas.microsoft.com/office/powerpoint/2010/main" val="2484722036"/>
       </p:ext>
     </p:extLst>
   </p:cSld>

</xml_diff>